<commit_message>
SoC estimation with Kalman added
</commit_message>
<xml_diff>
--- a/SoC Estimation.pptx
+++ b/SoC Estimation.pptx
@@ -22,6 +22,9 @@
     <p:sldId id="269" r:id="rId16"/>
     <p:sldId id="271" r:id="rId17"/>
     <p:sldId id="272" r:id="rId18"/>
+    <p:sldId id="273" r:id="rId19"/>
+    <p:sldId id="274" r:id="rId20"/>
+    <p:sldId id="275" r:id="rId21"/>
   </p:sldIdLst>
   <p:sldSz cx="12192000" cy="6858000"/>
   <p:notesSz cx="6858000" cy="9144000"/>
@@ -5815,7 +5818,24 @@
           <a:bodyPr/>
           <a:lstStyle/>
           <a:p>
-            <a:endParaRPr lang="en-US"/>
+            <a:r>
+              <a:rPr lang="en-US" b="1" dirty="0">
+                <a:solidFill>
+                  <a:srgbClr val="2C2C36"/>
+                </a:solidFill>
+                <a:effectLst/>
+              </a:rPr>
+              <a:t>Step 1: Prediction</a:t>
+            </a:r>
+            <a:br>
+              <a:rPr lang="en-US" b="1" dirty="0">
+                <a:solidFill>
+                  <a:srgbClr val="2C2C36"/>
+                </a:solidFill>
+                <a:effectLst/>
+              </a:rPr>
+            </a:br>
+            <a:endParaRPr lang="en-US" dirty="0"/>
           </a:p>
         </p:txBody>
       </p:sp>
@@ -5837,10 +5857,585 @@
         </p:nvSpPr>
         <p:spPr/>
         <p:txBody>
-          <a:bodyPr/>
+          <a:bodyPr>
+            <a:normAutofit fontScale="92500" lnSpcReduction="20000"/>
+          </a:bodyPr>
           <a:lstStyle/>
           <a:p>
-            <a:endParaRPr lang="en-US"/>
+            <a:pPr>
+              <a:spcBef>
+                <a:spcPts val="900"/>
+              </a:spcBef>
+              <a:spcAft>
+                <a:spcPts val="900"/>
+              </a:spcAft>
+              <a:buFont typeface="+mj-lt"/>
+              <a:buAutoNum type="arabicPeriod"/>
+            </a:pPr>
+            <a:r>
+              <a:rPr lang="en-US" b="0" dirty="0">
+                <a:solidFill>
+                  <a:srgbClr val="111827"/>
+                </a:solidFill>
+                <a:effectLst/>
+              </a:rPr>
+              <a:t>Predict the State Estimate </a:t>
+            </a:r>
+            <a:r>
+              <a:rPr lang="en-US" dirty="0">
+                <a:effectLst/>
+              </a:rPr>
+              <a:t>: Use the nonlinear state transition function </a:t>
+            </a:r>
+            <a:r>
+              <a:rPr lang="en-US" i="1" dirty="0">
+                <a:effectLst/>
+                <a:latin typeface="KaTeX_Math"/>
+              </a:rPr>
+              <a:t>f</a:t>
+            </a:r>
+            <a:r>
+              <a:rPr lang="en-US" dirty="0">
+                <a:effectLst/>
+                <a:latin typeface="KaTeX_Main"/>
+              </a:rPr>
+              <a:t>(⋅)</a:t>
+            </a:r>
+            <a:r>
+              <a:rPr lang="en-US" dirty="0">
+                <a:effectLst/>
+              </a:rPr>
+              <a:t> to predict the next state:</a:t>
+            </a:r>
+          </a:p>
+          <a:p>
+            <a:pPr>
+              <a:spcBef>
+                <a:spcPts val="900"/>
+              </a:spcBef>
+              <a:spcAft>
+                <a:spcPts val="900"/>
+              </a:spcAft>
+              <a:buFont typeface="+mj-lt"/>
+              <a:buAutoNum type="arabicPeriod"/>
+            </a:pPr>
+            <a:r>
+              <a:rPr lang="en-US" b="1" dirty="0">
+                <a:effectLst/>
+                <a:latin typeface="KaTeX_Main"/>
+              </a:rPr>
+              <a:t>x</a:t>
+            </a:r>
+            <a:r>
+              <a:rPr lang="en-US" dirty="0">
+                <a:effectLst/>
+                <a:latin typeface="KaTeX_Main"/>
+              </a:rPr>
+              <a:t>^</a:t>
+            </a:r>
+            <a:r>
+              <a:rPr lang="en-US" i="1" dirty="0">
+                <a:effectLst/>
+                <a:latin typeface="KaTeX_Math"/>
+              </a:rPr>
+              <a:t>k</a:t>
+            </a:r>
+            <a:r>
+              <a:rPr lang="en-US" dirty="0">
+                <a:effectLst/>
+                <a:latin typeface="KaTeX_Main"/>
+              </a:rPr>
+              <a:t>∣</a:t>
+            </a:r>
+            <a:r>
+              <a:rPr lang="en-US" i="1" dirty="0">
+                <a:effectLst/>
+                <a:latin typeface="KaTeX_Math"/>
+              </a:rPr>
+              <a:t>k</a:t>
+            </a:r>
+            <a:r>
+              <a:rPr lang="en-US" dirty="0">
+                <a:effectLst/>
+                <a:latin typeface="KaTeX_Main"/>
+              </a:rPr>
+              <a:t>−1​=</a:t>
+            </a:r>
+            <a:r>
+              <a:rPr lang="en-US" i="1" dirty="0">
+                <a:effectLst/>
+                <a:latin typeface="KaTeX_Math"/>
+              </a:rPr>
+              <a:t>f</a:t>
+            </a:r>
+            <a:r>
+              <a:rPr lang="en-US" dirty="0">
+                <a:effectLst/>
+                <a:latin typeface="KaTeX_Main"/>
+              </a:rPr>
+              <a:t>(</a:t>
+            </a:r>
+            <a:r>
+              <a:rPr lang="en-US" b="1" dirty="0">
+                <a:effectLst/>
+                <a:latin typeface="KaTeX_Main"/>
+              </a:rPr>
+              <a:t>x</a:t>
+            </a:r>
+            <a:r>
+              <a:rPr lang="en-US" dirty="0">
+                <a:effectLst/>
+                <a:latin typeface="KaTeX_Main"/>
+              </a:rPr>
+              <a:t>^</a:t>
+            </a:r>
+            <a:r>
+              <a:rPr lang="en-US" i="1" dirty="0">
+                <a:effectLst/>
+                <a:latin typeface="KaTeX_Math"/>
+              </a:rPr>
+              <a:t>k</a:t>
+            </a:r>
+            <a:r>
+              <a:rPr lang="en-US" dirty="0">
+                <a:effectLst/>
+                <a:latin typeface="KaTeX_Main"/>
+              </a:rPr>
+              <a:t>−1∣</a:t>
+            </a:r>
+            <a:r>
+              <a:rPr lang="en-US" i="1" dirty="0">
+                <a:effectLst/>
+                <a:latin typeface="KaTeX_Math"/>
+              </a:rPr>
+              <a:t>k</a:t>
+            </a:r>
+            <a:r>
+              <a:rPr lang="en-US" dirty="0">
+                <a:effectLst/>
+                <a:latin typeface="KaTeX_Main"/>
+              </a:rPr>
+              <a:t>−1​,</a:t>
+            </a:r>
+            <a:r>
+              <a:rPr lang="en-US" b="1" dirty="0" err="1">
+                <a:effectLst/>
+                <a:latin typeface="KaTeX_Main"/>
+              </a:rPr>
+              <a:t>u</a:t>
+            </a:r>
+            <a:r>
+              <a:rPr lang="en-US" i="1" dirty="0" err="1">
+                <a:effectLst/>
+                <a:latin typeface="KaTeX_Math"/>
+              </a:rPr>
+              <a:t>k</a:t>
+            </a:r>
+            <a:r>
+              <a:rPr lang="en-US" dirty="0">
+                <a:effectLst/>
+                <a:latin typeface="KaTeX_Main"/>
+              </a:rPr>
+              <a:t>​)</a:t>
+            </a:r>
+            <a:endParaRPr lang="en-US" dirty="0">
+              <a:effectLst/>
+            </a:endParaRPr>
+          </a:p>
+          <a:p>
+            <a:pPr>
+              <a:spcBef>
+                <a:spcPts val="900"/>
+              </a:spcBef>
+              <a:spcAft>
+                <a:spcPts val="900"/>
+              </a:spcAft>
+              <a:buFont typeface="+mj-lt"/>
+              <a:buAutoNum type="arabicPeriod"/>
+            </a:pPr>
+            <a:r>
+              <a:rPr lang="en-US" b="0" dirty="0">
+                <a:solidFill>
+                  <a:srgbClr val="111827"/>
+                </a:solidFill>
+                <a:effectLst/>
+              </a:rPr>
+              <a:t>Linearize the State Transition Model </a:t>
+            </a:r>
+            <a:r>
+              <a:rPr lang="en-US" dirty="0">
+                <a:effectLst/>
+              </a:rPr>
+              <a:t>: Compute the Jacobian matrix </a:t>
+            </a:r>
+            <a:r>
+              <a:rPr lang="en-US" b="1" dirty="0" err="1">
+                <a:effectLst/>
+                <a:latin typeface="KaTeX_Main"/>
+              </a:rPr>
+              <a:t>F</a:t>
+            </a:r>
+            <a:r>
+              <a:rPr lang="en-US" i="1" dirty="0" err="1">
+                <a:effectLst/>
+                <a:latin typeface="KaTeX_Math"/>
+              </a:rPr>
+              <a:t>k</a:t>
+            </a:r>
+            <a:r>
+              <a:rPr lang="en-US" dirty="0">
+                <a:effectLst/>
+                <a:latin typeface="KaTeX_Main"/>
+              </a:rPr>
+              <a:t>​</a:t>
+            </a:r>
+            <a:r>
+              <a:rPr lang="en-US" dirty="0">
+                <a:effectLst/>
+              </a:rPr>
+              <a:t> of the state transition function </a:t>
+            </a:r>
+            <a:r>
+              <a:rPr lang="en-US" i="1" dirty="0">
+                <a:effectLst/>
+                <a:latin typeface="KaTeX_Math"/>
+              </a:rPr>
+              <a:t>f</a:t>
+            </a:r>
+            <a:r>
+              <a:rPr lang="en-US" dirty="0">
+                <a:effectLst/>
+                <a:latin typeface="KaTeX_Main"/>
+              </a:rPr>
+              <a:t>(⋅)</a:t>
+            </a:r>
+            <a:r>
+              <a:rPr lang="en-US" dirty="0">
+                <a:effectLst/>
+              </a:rPr>
+              <a:t> with respect to the state:</a:t>
+            </a:r>
+          </a:p>
+          <a:p>
+            <a:pPr>
+              <a:spcBef>
+                <a:spcPts val="900"/>
+              </a:spcBef>
+              <a:spcAft>
+                <a:spcPts val="900"/>
+              </a:spcAft>
+              <a:buFont typeface="+mj-lt"/>
+              <a:buAutoNum type="arabicPeriod"/>
+            </a:pPr>
+            <a:r>
+              <a:rPr lang="en-US" b="1" dirty="0" err="1">
+                <a:effectLst/>
+                <a:latin typeface="KaTeX_Main"/>
+              </a:rPr>
+              <a:t>F</a:t>
+            </a:r>
+            <a:r>
+              <a:rPr lang="en-US" i="1" dirty="0" err="1">
+                <a:effectLst/>
+                <a:latin typeface="KaTeX_Math"/>
+              </a:rPr>
+              <a:t>k</a:t>
+            </a:r>
+            <a:r>
+              <a:rPr lang="en-US" dirty="0">
+                <a:effectLst/>
+                <a:latin typeface="KaTeX_Main"/>
+              </a:rPr>
+              <a:t>​=∂</a:t>
+            </a:r>
+            <a:r>
+              <a:rPr lang="en-US" b="1" dirty="0" err="1">
+                <a:effectLst/>
+                <a:latin typeface="KaTeX_Main"/>
+              </a:rPr>
+              <a:t>x</a:t>
+            </a:r>
+            <a:r>
+              <a:rPr lang="en-US" dirty="0" err="1">
+                <a:effectLst/>
+                <a:latin typeface="KaTeX_Main"/>
+              </a:rPr>
+              <a:t>∂</a:t>
+            </a:r>
+            <a:r>
+              <a:rPr lang="en-US" i="1" dirty="0" err="1">
+                <a:effectLst/>
+                <a:latin typeface="KaTeX_Math"/>
+              </a:rPr>
+              <a:t>f</a:t>
+            </a:r>
+            <a:r>
+              <a:rPr lang="en-US" dirty="0">
+                <a:effectLst/>
+                <a:latin typeface="KaTeX_Main"/>
+              </a:rPr>
+              <a:t>​​</a:t>
+            </a:r>
+            <a:r>
+              <a:rPr lang="en-US" b="1" dirty="0">
+                <a:effectLst/>
+                <a:latin typeface="KaTeX_Main"/>
+              </a:rPr>
+              <a:t>x</a:t>
+            </a:r>
+            <a:r>
+              <a:rPr lang="en-US" dirty="0">
+                <a:effectLst/>
+                <a:latin typeface="KaTeX_Main"/>
+              </a:rPr>
+              <a:t>^</a:t>
+            </a:r>
+            <a:r>
+              <a:rPr lang="en-US" i="1" dirty="0">
+                <a:effectLst/>
+                <a:latin typeface="KaTeX_Math"/>
+              </a:rPr>
+              <a:t>k</a:t>
+            </a:r>
+            <a:r>
+              <a:rPr lang="en-US" dirty="0">
+                <a:effectLst/>
+                <a:latin typeface="KaTeX_Main"/>
+              </a:rPr>
+              <a:t>−1∣</a:t>
+            </a:r>
+            <a:r>
+              <a:rPr lang="en-US" i="1" dirty="0">
+                <a:effectLst/>
+                <a:latin typeface="KaTeX_Math"/>
+              </a:rPr>
+              <a:t>k</a:t>
+            </a:r>
+            <a:r>
+              <a:rPr lang="en-US" dirty="0">
+                <a:effectLst/>
+                <a:latin typeface="KaTeX_Main"/>
+              </a:rPr>
+              <a:t>−1​,</a:t>
+            </a:r>
+            <a:r>
+              <a:rPr lang="en-US" b="1" dirty="0" err="1">
+                <a:effectLst/>
+                <a:latin typeface="KaTeX_Main"/>
+              </a:rPr>
+              <a:t>u</a:t>
+            </a:r>
+            <a:r>
+              <a:rPr lang="en-US" i="1" dirty="0" err="1">
+                <a:effectLst/>
+                <a:latin typeface="KaTeX_Math"/>
+              </a:rPr>
+              <a:t>k</a:t>
+            </a:r>
+            <a:r>
+              <a:rPr lang="en-US" dirty="0">
+                <a:effectLst/>
+                <a:latin typeface="KaTeX_Main"/>
+              </a:rPr>
+              <a:t>​​</a:t>
+            </a:r>
+            <a:endParaRPr lang="en-US" dirty="0">
+              <a:effectLst/>
+            </a:endParaRPr>
+          </a:p>
+          <a:p>
+            <a:pPr>
+              <a:spcBef>
+                <a:spcPts val="900"/>
+              </a:spcBef>
+              <a:spcAft>
+                <a:spcPts val="900"/>
+              </a:spcAft>
+              <a:buFont typeface="+mj-lt"/>
+              <a:buAutoNum type="arabicPeriod"/>
+            </a:pPr>
+            <a:r>
+              <a:rPr lang="en-US" b="0" dirty="0">
+                <a:solidFill>
+                  <a:srgbClr val="111827"/>
+                </a:solidFill>
+                <a:effectLst/>
+              </a:rPr>
+              <a:t>Predict the Error Covariance </a:t>
+            </a:r>
+            <a:r>
+              <a:rPr lang="en-US" dirty="0">
+                <a:effectLst/>
+              </a:rPr>
+              <a:t>: Update the error covariance matrix </a:t>
+            </a:r>
+            <a:r>
+              <a:rPr lang="en-US" b="1" dirty="0">
+                <a:effectLst/>
+                <a:latin typeface="KaTeX_Main"/>
+              </a:rPr>
+              <a:t>P</a:t>
+            </a:r>
+            <a:r>
+              <a:rPr lang="en-US" dirty="0">
+                <a:effectLst/>
+              </a:rPr>
+              <a:t> using the linearized model:</a:t>
+            </a:r>
+          </a:p>
+          <a:p>
+            <a:pPr>
+              <a:buNone/>
+            </a:pPr>
+            <a:r>
+              <a:rPr lang="en-US" b="1" dirty="0">
+                <a:effectLst/>
+                <a:latin typeface="KaTeX_Main"/>
+              </a:rPr>
+              <a:t>P</a:t>
+            </a:r>
+            <a:r>
+              <a:rPr lang="en-US" i="1" dirty="0">
+                <a:effectLst/>
+                <a:latin typeface="KaTeX_Math"/>
+              </a:rPr>
+              <a:t>k</a:t>
+            </a:r>
+            <a:r>
+              <a:rPr lang="en-US" dirty="0">
+                <a:effectLst/>
+                <a:latin typeface="KaTeX_Main"/>
+              </a:rPr>
+              <a:t>∣</a:t>
+            </a:r>
+            <a:r>
+              <a:rPr lang="en-US" i="1" dirty="0">
+                <a:effectLst/>
+                <a:latin typeface="KaTeX_Math"/>
+              </a:rPr>
+              <a:t>k</a:t>
+            </a:r>
+            <a:r>
+              <a:rPr lang="en-US" dirty="0">
+                <a:effectLst/>
+                <a:latin typeface="KaTeX_Main"/>
+              </a:rPr>
+              <a:t>−1​=</a:t>
+            </a:r>
+            <a:r>
+              <a:rPr lang="en-US" b="1" dirty="0" err="1">
+                <a:effectLst/>
+                <a:latin typeface="KaTeX_Main"/>
+              </a:rPr>
+              <a:t>F</a:t>
+            </a:r>
+            <a:r>
+              <a:rPr lang="en-US" i="1" dirty="0" err="1">
+                <a:effectLst/>
+                <a:latin typeface="KaTeX_Math"/>
+              </a:rPr>
+              <a:t>k</a:t>
+            </a:r>
+            <a:r>
+              <a:rPr lang="en-US" dirty="0">
+                <a:effectLst/>
+                <a:latin typeface="KaTeX_Main"/>
+              </a:rPr>
+              <a:t>​</a:t>
+            </a:r>
+            <a:r>
+              <a:rPr lang="en-US" b="1" dirty="0">
+                <a:effectLst/>
+                <a:latin typeface="KaTeX_Main"/>
+              </a:rPr>
+              <a:t>P</a:t>
+            </a:r>
+            <a:r>
+              <a:rPr lang="en-US" i="1" dirty="0">
+                <a:effectLst/>
+                <a:latin typeface="KaTeX_Math"/>
+              </a:rPr>
+              <a:t>k</a:t>
+            </a:r>
+            <a:r>
+              <a:rPr lang="en-US" dirty="0">
+                <a:effectLst/>
+                <a:latin typeface="KaTeX_Main"/>
+              </a:rPr>
+              <a:t>−1∣</a:t>
+            </a:r>
+            <a:r>
+              <a:rPr lang="en-US" i="1" dirty="0">
+                <a:effectLst/>
+                <a:latin typeface="KaTeX_Math"/>
+              </a:rPr>
+              <a:t>k</a:t>
+            </a:r>
+            <a:r>
+              <a:rPr lang="en-US" dirty="0">
+                <a:effectLst/>
+                <a:latin typeface="KaTeX_Main"/>
+              </a:rPr>
+              <a:t>−1​</a:t>
+            </a:r>
+            <a:r>
+              <a:rPr lang="en-US" b="1" dirty="0" err="1">
+                <a:effectLst/>
+                <a:latin typeface="KaTeX_Main"/>
+              </a:rPr>
+              <a:t>F</a:t>
+            </a:r>
+            <a:r>
+              <a:rPr lang="en-US" i="1" dirty="0" err="1">
+                <a:effectLst/>
+                <a:latin typeface="KaTeX_Math"/>
+              </a:rPr>
+              <a:t>kT</a:t>
+            </a:r>
+            <a:r>
+              <a:rPr lang="en-US" dirty="0">
+                <a:effectLst/>
+                <a:latin typeface="KaTeX_Main"/>
+              </a:rPr>
+              <a:t>​+</a:t>
+            </a:r>
+            <a:r>
+              <a:rPr lang="en-US" b="1" dirty="0" err="1">
+                <a:effectLst/>
+                <a:latin typeface="KaTeX_Main"/>
+              </a:rPr>
+              <a:t>Q</a:t>
+            </a:r>
+            <a:r>
+              <a:rPr lang="en-US" b="0" i="1" dirty="0" err="1">
+                <a:solidFill>
+                  <a:srgbClr val="2C2C36"/>
+                </a:solidFill>
+                <a:effectLst/>
+                <a:latin typeface="KaTeX_Math"/>
+              </a:rPr>
+              <a:t>k</a:t>
+            </a:r>
+            <a:r>
+              <a:rPr lang="en-US" b="0" i="0" dirty="0">
+                <a:solidFill>
+                  <a:srgbClr val="2C2C36"/>
+                </a:solidFill>
+                <a:effectLst/>
+                <a:latin typeface="KaTeX_Main"/>
+              </a:rPr>
+              <a:t>​</a:t>
+            </a:r>
+            <a:br>
+              <a:rPr lang="en-US" b="0" i="0" dirty="0">
+                <a:solidFill>
+                  <a:srgbClr val="2C2C36"/>
+                </a:solidFill>
+                <a:effectLst/>
+                <a:latin typeface="KaTeX_Main"/>
+              </a:rPr>
+            </a:br>
+            <a:endParaRPr lang="en-US" dirty="0"/>
           </a:p>
         </p:txBody>
       </p:sp>
@@ -5848,6 +6443,2018 @@
     <p:extLst>
       <p:ext uri="{BB962C8B-B14F-4D97-AF65-F5344CB8AC3E}">
         <p14:creationId xmlns:p14="http://schemas.microsoft.com/office/powerpoint/2010/main" val="1884097833"/>
+      </p:ext>
+    </p:extLst>
+  </p:cSld>
+  <p:clrMapOvr>
+    <a:masterClrMapping/>
+  </p:clrMapOvr>
+</p:sld>
+</file>
+
+<file path=ppt/slides/slide18.xml><?xml version="1.0" encoding="utf-8"?>
+<p:sld xmlns:a="http://schemas.openxmlformats.org/drawingml/2006/main" xmlns:r="http://schemas.openxmlformats.org/officeDocument/2006/relationships" xmlns:p="http://schemas.openxmlformats.org/presentationml/2006/main">
+  <p:cSld>
+    <p:spTree>
+      <p:nvGrpSpPr>
+        <p:cNvPr id="1" name=""/>
+        <p:cNvGrpSpPr/>
+        <p:nvPr/>
+      </p:nvGrpSpPr>
+      <p:grpSpPr>
+        <a:xfrm>
+          <a:off x="0" y="0"/>
+          <a:ext cx="0" cy="0"/>
+          <a:chOff x="0" y="0"/>
+          <a:chExt cx="0" cy="0"/>
+        </a:xfrm>
+      </p:grpSpPr>
+      <p:sp>
+        <p:nvSpPr>
+          <p:cNvPr id="2" name="Title 1">
+            <a:extLst>
+              <a:ext uri="{FF2B5EF4-FFF2-40B4-BE49-F238E27FC236}">
+                <a16:creationId xmlns:a16="http://schemas.microsoft.com/office/drawing/2014/main" id="{3959F1AF-14A2-AE7A-9D29-11D7E9E69FED}"/>
+              </a:ext>
+            </a:extLst>
+          </p:cNvPr>
+          <p:cNvSpPr>
+            <a:spLocks noGrp="1"/>
+          </p:cNvSpPr>
+          <p:nvPr>
+            <p:ph type="title"/>
+          </p:nvPr>
+        </p:nvSpPr>
+        <p:spPr/>
+        <p:txBody>
+          <a:bodyPr>
+            <a:normAutofit/>
+          </a:bodyPr>
+          <a:lstStyle/>
+          <a:p>
+            <a:pPr>
+              <a:spcBef>
+                <a:spcPts val="900"/>
+              </a:spcBef>
+              <a:spcAft>
+                <a:spcPts val="900"/>
+              </a:spcAft>
+            </a:pPr>
+            <a:r>
+              <a:rPr lang="en-US" b="1" i="0" dirty="0">
+                <a:solidFill>
+                  <a:srgbClr val="2C2C36"/>
+                </a:solidFill>
+                <a:effectLst/>
+                <a:latin typeface="system-ui"/>
+              </a:rPr>
+              <a:t>Step 2: Update</a:t>
+            </a:r>
+            <a:br>
+              <a:rPr lang="en-US" b="1" i="0" dirty="0">
+                <a:solidFill>
+                  <a:srgbClr val="2C2C36"/>
+                </a:solidFill>
+                <a:effectLst/>
+                <a:latin typeface="system-ui"/>
+              </a:rPr>
+            </a:br>
+            <a:endParaRPr lang="en-US" dirty="0"/>
+          </a:p>
+        </p:txBody>
+      </p:sp>
+      <p:sp>
+        <p:nvSpPr>
+          <p:cNvPr id="3" name="Content Placeholder 2">
+            <a:extLst>
+              <a:ext uri="{FF2B5EF4-FFF2-40B4-BE49-F238E27FC236}">
+                <a16:creationId xmlns:a16="http://schemas.microsoft.com/office/drawing/2014/main" id="{4A3288D8-6A54-DB4C-EDE2-364933EBD371}"/>
+              </a:ext>
+            </a:extLst>
+          </p:cNvPr>
+          <p:cNvSpPr>
+            <a:spLocks noGrp="1"/>
+          </p:cNvSpPr>
+          <p:nvPr>
+            <p:ph idx="1"/>
+          </p:nvPr>
+        </p:nvSpPr>
+        <p:spPr/>
+        <p:txBody>
+          <a:bodyPr>
+            <a:normAutofit fontScale="55000" lnSpcReduction="20000"/>
+          </a:bodyPr>
+          <a:lstStyle/>
+          <a:p>
+            <a:pPr algn="l">
+              <a:spcBef>
+                <a:spcPts val="900"/>
+              </a:spcBef>
+              <a:spcAft>
+                <a:spcPts val="900"/>
+              </a:spcAft>
+              <a:buFont typeface="+mj-lt"/>
+              <a:buAutoNum type="arabicPeriod"/>
+            </a:pPr>
+            <a:r>
+              <a:rPr lang="en-US" b="0" i="0" dirty="0">
+                <a:solidFill>
+                  <a:srgbClr val="111827"/>
+                </a:solidFill>
+                <a:effectLst/>
+                <a:latin typeface="system-ui"/>
+              </a:rPr>
+              <a:t>Predict the Measurement </a:t>
+            </a:r>
+            <a:r>
+              <a:rPr lang="en-US" b="0" i="0" dirty="0">
+                <a:solidFill>
+                  <a:srgbClr val="2C2C36"/>
+                </a:solidFill>
+                <a:effectLst/>
+                <a:latin typeface="system-ui"/>
+              </a:rPr>
+              <a:t>: Use the nonlinear measurement function </a:t>
+            </a:r>
+            <a:r>
+              <a:rPr lang="en-US" b="0" i="1" dirty="0">
+                <a:solidFill>
+                  <a:srgbClr val="2C2C36"/>
+                </a:solidFill>
+                <a:effectLst/>
+                <a:latin typeface="KaTeX_Math"/>
+              </a:rPr>
+              <a:t>h</a:t>
+            </a:r>
+            <a:r>
+              <a:rPr lang="en-US" b="0" i="0" dirty="0">
+                <a:solidFill>
+                  <a:srgbClr val="2C2C36"/>
+                </a:solidFill>
+                <a:effectLst/>
+                <a:latin typeface="KaTeX_Main"/>
+              </a:rPr>
+              <a:t>(⋅)</a:t>
+            </a:r>
+            <a:r>
+              <a:rPr lang="en-US" b="0" i="0" dirty="0">
+                <a:solidFill>
+                  <a:srgbClr val="2C2C36"/>
+                </a:solidFill>
+                <a:effectLst/>
+                <a:latin typeface="system-ui"/>
+              </a:rPr>
+              <a:t> to predict the measurement:</a:t>
+            </a:r>
+          </a:p>
+          <a:p>
+            <a:pPr marL="0" indent="0" algn="l">
+              <a:spcBef>
+                <a:spcPts val="900"/>
+              </a:spcBef>
+              <a:spcAft>
+                <a:spcPts val="900"/>
+              </a:spcAft>
+              <a:buNone/>
+            </a:pPr>
+            <a:r>
+              <a:rPr lang="en-US" b="1" i="0" dirty="0">
+                <a:solidFill>
+                  <a:srgbClr val="2C2C36"/>
+                </a:solidFill>
+                <a:effectLst/>
+                <a:latin typeface="KaTeX_Main"/>
+              </a:rPr>
+              <a:t>z</a:t>
+            </a:r>
+            <a:r>
+              <a:rPr lang="en-US" b="0" i="0" dirty="0">
+                <a:solidFill>
+                  <a:srgbClr val="2C2C36"/>
+                </a:solidFill>
+                <a:effectLst/>
+                <a:latin typeface="KaTeX_Main"/>
+              </a:rPr>
+              <a:t>^</a:t>
+            </a:r>
+            <a:r>
+              <a:rPr lang="en-US" b="0" i="1" dirty="0">
+                <a:solidFill>
+                  <a:srgbClr val="2C2C36"/>
+                </a:solidFill>
+                <a:effectLst/>
+                <a:latin typeface="KaTeX_Math"/>
+              </a:rPr>
+              <a:t>k</a:t>
+            </a:r>
+            <a:r>
+              <a:rPr lang="en-US" b="0" i="0" dirty="0">
+                <a:solidFill>
+                  <a:srgbClr val="2C2C36"/>
+                </a:solidFill>
+                <a:effectLst/>
+                <a:latin typeface="KaTeX_Main"/>
+              </a:rPr>
+              <a:t>∣</a:t>
+            </a:r>
+            <a:r>
+              <a:rPr lang="en-US" b="0" i="1" dirty="0">
+                <a:solidFill>
+                  <a:srgbClr val="2C2C36"/>
+                </a:solidFill>
+                <a:effectLst/>
+                <a:latin typeface="KaTeX_Math"/>
+              </a:rPr>
+              <a:t>k</a:t>
+            </a:r>
+            <a:r>
+              <a:rPr lang="en-US" b="0" i="0" dirty="0">
+                <a:solidFill>
+                  <a:srgbClr val="2C2C36"/>
+                </a:solidFill>
+                <a:effectLst/>
+                <a:latin typeface="KaTeX_Main"/>
+              </a:rPr>
+              <a:t>−1​=</a:t>
+            </a:r>
+            <a:r>
+              <a:rPr lang="en-US" b="0" i="1" dirty="0">
+                <a:solidFill>
+                  <a:srgbClr val="2C2C36"/>
+                </a:solidFill>
+                <a:effectLst/>
+                <a:latin typeface="KaTeX_Math"/>
+              </a:rPr>
+              <a:t>h</a:t>
+            </a:r>
+            <a:r>
+              <a:rPr lang="en-US" b="0" i="0" dirty="0">
+                <a:solidFill>
+                  <a:srgbClr val="2C2C36"/>
+                </a:solidFill>
+                <a:effectLst/>
+                <a:latin typeface="KaTeX_Main"/>
+              </a:rPr>
+              <a:t>(</a:t>
+            </a:r>
+            <a:r>
+              <a:rPr lang="en-US" b="1" i="0" dirty="0">
+                <a:solidFill>
+                  <a:srgbClr val="2C2C36"/>
+                </a:solidFill>
+                <a:effectLst/>
+                <a:latin typeface="KaTeX_Main"/>
+              </a:rPr>
+              <a:t>x</a:t>
+            </a:r>
+            <a:r>
+              <a:rPr lang="en-US" b="0" i="0" dirty="0">
+                <a:solidFill>
+                  <a:srgbClr val="2C2C36"/>
+                </a:solidFill>
+                <a:effectLst/>
+                <a:latin typeface="KaTeX_Main"/>
+              </a:rPr>
+              <a:t>^</a:t>
+            </a:r>
+            <a:r>
+              <a:rPr lang="en-US" b="0" i="1" dirty="0">
+                <a:solidFill>
+                  <a:srgbClr val="2C2C36"/>
+                </a:solidFill>
+                <a:effectLst/>
+                <a:latin typeface="KaTeX_Math"/>
+              </a:rPr>
+              <a:t>k</a:t>
+            </a:r>
+            <a:r>
+              <a:rPr lang="en-US" b="0" i="0" dirty="0">
+                <a:solidFill>
+                  <a:srgbClr val="2C2C36"/>
+                </a:solidFill>
+                <a:effectLst/>
+                <a:latin typeface="KaTeX_Main"/>
+              </a:rPr>
+              <a:t>∣</a:t>
+            </a:r>
+            <a:r>
+              <a:rPr lang="en-US" b="0" i="1" dirty="0">
+                <a:solidFill>
+                  <a:srgbClr val="2C2C36"/>
+                </a:solidFill>
+                <a:effectLst/>
+                <a:latin typeface="KaTeX_Math"/>
+              </a:rPr>
+              <a:t>k</a:t>
+            </a:r>
+            <a:r>
+              <a:rPr lang="en-US" b="0" i="0" dirty="0">
+                <a:solidFill>
+                  <a:srgbClr val="2C2C36"/>
+                </a:solidFill>
+                <a:effectLst/>
+                <a:latin typeface="KaTeX_Main"/>
+              </a:rPr>
+              <a:t>−1​)</a:t>
+            </a:r>
+            <a:endParaRPr lang="en-US" b="0" i="0" dirty="0">
+              <a:solidFill>
+                <a:srgbClr val="2C2C36"/>
+              </a:solidFill>
+              <a:effectLst/>
+              <a:latin typeface="system-ui"/>
+            </a:endParaRPr>
+          </a:p>
+          <a:p>
+            <a:pPr algn="l">
+              <a:spcBef>
+                <a:spcPts val="900"/>
+              </a:spcBef>
+              <a:spcAft>
+                <a:spcPts val="900"/>
+              </a:spcAft>
+              <a:buFont typeface="+mj-lt"/>
+              <a:buAutoNum type="arabicPeriod"/>
+            </a:pPr>
+            <a:r>
+              <a:rPr lang="en-US" b="0" i="0" dirty="0">
+                <a:solidFill>
+                  <a:srgbClr val="111827"/>
+                </a:solidFill>
+                <a:effectLst/>
+                <a:latin typeface="system-ui"/>
+              </a:rPr>
+              <a:t>Linearize the Measurement Model </a:t>
+            </a:r>
+            <a:r>
+              <a:rPr lang="en-US" b="0" i="0" dirty="0">
+                <a:solidFill>
+                  <a:srgbClr val="2C2C36"/>
+                </a:solidFill>
+                <a:effectLst/>
+                <a:latin typeface="system-ui"/>
+              </a:rPr>
+              <a:t>: Compute the Jacobian matrix </a:t>
+            </a:r>
+            <a:r>
+              <a:rPr lang="en-US" b="1" i="0" dirty="0" err="1">
+                <a:solidFill>
+                  <a:srgbClr val="2C2C36"/>
+                </a:solidFill>
+                <a:effectLst/>
+                <a:latin typeface="KaTeX_Main"/>
+              </a:rPr>
+              <a:t>H</a:t>
+            </a:r>
+            <a:r>
+              <a:rPr lang="en-US" b="0" i="1" dirty="0" err="1">
+                <a:solidFill>
+                  <a:srgbClr val="2C2C36"/>
+                </a:solidFill>
+                <a:effectLst/>
+                <a:latin typeface="KaTeX_Math"/>
+              </a:rPr>
+              <a:t>k</a:t>
+            </a:r>
+            <a:r>
+              <a:rPr lang="en-US" b="0" i="0" dirty="0">
+                <a:solidFill>
+                  <a:srgbClr val="2C2C36"/>
+                </a:solidFill>
+                <a:effectLst/>
+                <a:latin typeface="KaTeX_Main"/>
+              </a:rPr>
+              <a:t>​</a:t>
+            </a:r>
+            <a:r>
+              <a:rPr lang="en-US" b="0" i="0" dirty="0">
+                <a:solidFill>
+                  <a:srgbClr val="2C2C36"/>
+                </a:solidFill>
+                <a:effectLst/>
+                <a:latin typeface="system-ui"/>
+              </a:rPr>
+              <a:t> of the measurement function </a:t>
+            </a:r>
+            <a:r>
+              <a:rPr lang="en-US" b="0" i="1" dirty="0">
+                <a:solidFill>
+                  <a:srgbClr val="2C2C36"/>
+                </a:solidFill>
+                <a:effectLst/>
+                <a:latin typeface="KaTeX_Math"/>
+              </a:rPr>
+              <a:t>h</a:t>
+            </a:r>
+            <a:r>
+              <a:rPr lang="en-US" b="0" i="0" dirty="0">
+                <a:solidFill>
+                  <a:srgbClr val="2C2C36"/>
+                </a:solidFill>
+                <a:effectLst/>
+                <a:latin typeface="KaTeX_Main"/>
+              </a:rPr>
+              <a:t>(⋅)</a:t>
+            </a:r>
+            <a:r>
+              <a:rPr lang="en-US" b="0" i="0" dirty="0">
+                <a:solidFill>
+                  <a:srgbClr val="2C2C36"/>
+                </a:solidFill>
+                <a:effectLst/>
+                <a:latin typeface="system-ui"/>
+              </a:rPr>
+              <a:t> with respect to the state:</a:t>
+            </a:r>
+          </a:p>
+          <a:p>
+            <a:pPr marL="0" indent="0" algn="l">
+              <a:spcBef>
+                <a:spcPts val="900"/>
+              </a:spcBef>
+              <a:spcAft>
+                <a:spcPts val="900"/>
+              </a:spcAft>
+              <a:buNone/>
+            </a:pPr>
+            <a:r>
+              <a:rPr lang="en-US" b="1" i="0" dirty="0" err="1">
+                <a:solidFill>
+                  <a:srgbClr val="2C2C36"/>
+                </a:solidFill>
+                <a:effectLst/>
+                <a:latin typeface="KaTeX_Main"/>
+              </a:rPr>
+              <a:t>H</a:t>
+            </a:r>
+            <a:r>
+              <a:rPr lang="en-US" b="0" i="1" dirty="0" err="1">
+                <a:solidFill>
+                  <a:srgbClr val="2C2C36"/>
+                </a:solidFill>
+                <a:effectLst/>
+                <a:latin typeface="KaTeX_Math"/>
+              </a:rPr>
+              <a:t>k</a:t>
+            </a:r>
+            <a:r>
+              <a:rPr lang="en-US" b="0" i="0" dirty="0">
+                <a:solidFill>
+                  <a:srgbClr val="2C2C36"/>
+                </a:solidFill>
+                <a:effectLst/>
+                <a:latin typeface="KaTeX_Main"/>
+              </a:rPr>
+              <a:t>​=∂</a:t>
+            </a:r>
+            <a:r>
+              <a:rPr lang="en-US" b="1" i="0" dirty="0" err="1">
+                <a:solidFill>
+                  <a:srgbClr val="2C2C36"/>
+                </a:solidFill>
+                <a:effectLst/>
+                <a:latin typeface="KaTeX_Main"/>
+              </a:rPr>
+              <a:t>x</a:t>
+            </a:r>
+            <a:r>
+              <a:rPr lang="en-US" b="0" i="0" dirty="0" err="1">
+                <a:solidFill>
+                  <a:srgbClr val="2C2C36"/>
+                </a:solidFill>
+                <a:effectLst/>
+                <a:latin typeface="KaTeX_Main"/>
+              </a:rPr>
+              <a:t>∂</a:t>
+            </a:r>
+            <a:r>
+              <a:rPr lang="en-US" b="0" i="1" dirty="0" err="1">
+                <a:solidFill>
+                  <a:srgbClr val="2C2C36"/>
+                </a:solidFill>
+                <a:effectLst/>
+                <a:latin typeface="KaTeX_Math"/>
+              </a:rPr>
+              <a:t>h</a:t>
+            </a:r>
+            <a:r>
+              <a:rPr lang="en-US" b="0" i="0" dirty="0">
+                <a:solidFill>
+                  <a:srgbClr val="2C2C36"/>
+                </a:solidFill>
+                <a:effectLst/>
+                <a:latin typeface="KaTeX_Main"/>
+              </a:rPr>
+              <a:t>​​</a:t>
+            </a:r>
+            <a:r>
+              <a:rPr lang="en-US" b="1" i="0" dirty="0">
+                <a:solidFill>
+                  <a:srgbClr val="2C2C36"/>
+                </a:solidFill>
+                <a:effectLst/>
+                <a:latin typeface="KaTeX_Main"/>
+              </a:rPr>
+              <a:t>x</a:t>
+            </a:r>
+            <a:r>
+              <a:rPr lang="en-US" b="0" i="0" dirty="0">
+                <a:solidFill>
+                  <a:srgbClr val="2C2C36"/>
+                </a:solidFill>
+                <a:effectLst/>
+                <a:latin typeface="KaTeX_Main"/>
+              </a:rPr>
+              <a:t>^</a:t>
+            </a:r>
+            <a:r>
+              <a:rPr lang="en-US" b="0" i="1" dirty="0">
+                <a:solidFill>
+                  <a:srgbClr val="2C2C36"/>
+                </a:solidFill>
+                <a:effectLst/>
+                <a:latin typeface="KaTeX_Math"/>
+              </a:rPr>
+              <a:t>k</a:t>
+            </a:r>
+            <a:r>
+              <a:rPr lang="en-US" b="0" i="0" dirty="0">
+                <a:solidFill>
+                  <a:srgbClr val="2C2C36"/>
+                </a:solidFill>
+                <a:effectLst/>
+                <a:latin typeface="KaTeX_Main"/>
+              </a:rPr>
+              <a:t>∣</a:t>
+            </a:r>
+            <a:r>
+              <a:rPr lang="en-US" b="0" i="1" dirty="0">
+                <a:solidFill>
+                  <a:srgbClr val="2C2C36"/>
+                </a:solidFill>
+                <a:effectLst/>
+                <a:latin typeface="KaTeX_Math"/>
+              </a:rPr>
+              <a:t>k</a:t>
+            </a:r>
+            <a:r>
+              <a:rPr lang="en-US" b="0" i="0" dirty="0">
+                <a:solidFill>
+                  <a:srgbClr val="2C2C36"/>
+                </a:solidFill>
+                <a:effectLst/>
+                <a:latin typeface="KaTeX_Main"/>
+              </a:rPr>
+              <a:t>−1​​</a:t>
+            </a:r>
+            <a:endParaRPr lang="en-US" b="0" i="0" dirty="0">
+              <a:solidFill>
+                <a:srgbClr val="2C2C36"/>
+              </a:solidFill>
+              <a:effectLst/>
+              <a:latin typeface="system-ui"/>
+            </a:endParaRPr>
+          </a:p>
+          <a:p>
+            <a:pPr algn="l">
+              <a:spcBef>
+                <a:spcPts val="900"/>
+              </a:spcBef>
+              <a:spcAft>
+                <a:spcPts val="900"/>
+              </a:spcAft>
+              <a:buFont typeface="+mj-lt"/>
+              <a:buAutoNum type="arabicPeriod"/>
+            </a:pPr>
+            <a:r>
+              <a:rPr lang="en-US" b="0" i="0" dirty="0">
+                <a:solidFill>
+                  <a:srgbClr val="111827"/>
+                </a:solidFill>
+                <a:effectLst/>
+                <a:latin typeface="system-ui"/>
+              </a:rPr>
+              <a:t>Compute the Kalman Gain </a:t>
+            </a:r>
+            <a:r>
+              <a:rPr lang="en-US" b="0" i="0" dirty="0">
+                <a:solidFill>
+                  <a:srgbClr val="2C2C36"/>
+                </a:solidFill>
+                <a:effectLst/>
+                <a:latin typeface="system-ui"/>
+              </a:rPr>
+              <a:t>: Calculate the Kalman gain </a:t>
+            </a:r>
+            <a:r>
+              <a:rPr lang="en-US" b="1" i="0" dirty="0">
+                <a:solidFill>
+                  <a:srgbClr val="2C2C36"/>
+                </a:solidFill>
+                <a:effectLst/>
+                <a:latin typeface="KaTeX_Main"/>
+              </a:rPr>
+              <a:t>K</a:t>
+            </a:r>
+            <a:r>
+              <a:rPr lang="en-US" b="0" i="1" dirty="0">
+                <a:solidFill>
+                  <a:srgbClr val="2C2C36"/>
+                </a:solidFill>
+                <a:effectLst/>
+                <a:latin typeface="KaTeX_Math"/>
+              </a:rPr>
+              <a:t>k</a:t>
+            </a:r>
+            <a:r>
+              <a:rPr lang="en-US" b="0" i="0" dirty="0">
+                <a:solidFill>
+                  <a:srgbClr val="2C2C36"/>
+                </a:solidFill>
+                <a:effectLst/>
+                <a:latin typeface="KaTeX_Main"/>
+              </a:rPr>
+              <a:t>​</a:t>
+            </a:r>
+            <a:r>
+              <a:rPr lang="en-US" b="0" i="0" dirty="0">
+                <a:solidFill>
+                  <a:srgbClr val="2C2C36"/>
+                </a:solidFill>
+                <a:effectLst/>
+                <a:latin typeface="system-ui"/>
+              </a:rPr>
+              <a:t> using the linearized measurement model:</a:t>
+            </a:r>
+          </a:p>
+          <a:p>
+            <a:pPr marL="0" indent="0" algn="l">
+              <a:spcBef>
+                <a:spcPts val="900"/>
+              </a:spcBef>
+              <a:spcAft>
+                <a:spcPts val="900"/>
+              </a:spcAft>
+              <a:buNone/>
+            </a:pPr>
+            <a:r>
+              <a:rPr lang="en-US" b="1" i="0" dirty="0">
+                <a:solidFill>
+                  <a:srgbClr val="2C2C36"/>
+                </a:solidFill>
+                <a:effectLst/>
+                <a:latin typeface="KaTeX_Main"/>
+              </a:rPr>
+              <a:t>K</a:t>
+            </a:r>
+            <a:r>
+              <a:rPr lang="en-US" b="0" i="1" dirty="0">
+                <a:solidFill>
+                  <a:srgbClr val="2C2C36"/>
+                </a:solidFill>
+                <a:effectLst/>
+                <a:latin typeface="KaTeX_Math"/>
+              </a:rPr>
+              <a:t>k</a:t>
+            </a:r>
+            <a:r>
+              <a:rPr lang="en-US" b="0" i="0" dirty="0">
+                <a:solidFill>
+                  <a:srgbClr val="2C2C36"/>
+                </a:solidFill>
+                <a:effectLst/>
+                <a:latin typeface="KaTeX_Main"/>
+              </a:rPr>
+              <a:t>​=</a:t>
+            </a:r>
+            <a:r>
+              <a:rPr lang="en-US" b="1" i="0" dirty="0">
+                <a:solidFill>
+                  <a:srgbClr val="2C2C36"/>
+                </a:solidFill>
+                <a:effectLst/>
+                <a:latin typeface="KaTeX_Main"/>
+              </a:rPr>
+              <a:t>P</a:t>
+            </a:r>
+            <a:r>
+              <a:rPr lang="en-US" b="0" i="1" dirty="0">
+                <a:solidFill>
+                  <a:srgbClr val="2C2C36"/>
+                </a:solidFill>
+                <a:effectLst/>
+                <a:latin typeface="KaTeX_Math"/>
+              </a:rPr>
+              <a:t>k</a:t>
+            </a:r>
+            <a:r>
+              <a:rPr lang="en-US" b="0" i="0" dirty="0">
+                <a:solidFill>
+                  <a:srgbClr val="2C2C36"/>
+                </a:solidFill>
+                <a:effectLst/>
+                <a:latin typeface="KaTeX_Main"/>
+              </a:rPr>
+              <a:t>∣</a:t>
+            </a:r>
+            <a:r>
+              <a:rPr lang="en-US" b="0" i="1" dirty="0">
+                <a:solidFill>
+                  <a:srgbClr val="2C2C36"/>
+                </a:solidFill>
+                <a:effectLst/>
+                <a:latin typeface="KaTeX_Math"/>
+              </a:rPr>
+              <a:t>k</a:t>
+            </a:r>
+            <a:r>
+              <a:rPr lang="en-US" b="0" i="0" dirty="0">
+                <a:solidFill>
+                  <a:srgbClr val="2C2C36"/>
+                </a:solidFill>
+                <a:effectLst/>
+                <a:latin typeface="KaTeX_Main"/>
+              </a:rPr>
+              <a:t>−1​</a:t>
+            </a:r>
+            <a:r>
+              <a:rPr lang="en-US" b="1" i="0" dirty="0" err="1">
+                <a:solidFill>
+                  <a:srgbClr val="2C2C36"/>
+                </a:solidFill>
+                <a:effectLst/>
+                <a:latin typeface="KaTeX_Main"/>
+              </a:rPr>
+              <a:t>H</a:t>
+            </a:r>
+            <a:r>
+              <a:rPr lang="en-US" b="0" i="1" dirty="0" err="1">
+                <a:solidFill>
+                  <a:srgbClr val="2C2C36"/>
+                </a:solidFill>
+                <a:effectLst/>
+                <a:latin typeface="KaTeX_Math"/>
+              </a:rPr>
+              <a:t>kT</a:t>
+            </a:r>
+            <a:r>
+              <a:rPr lang="en-US" b="0" i="0" dirty="0">
+                <a:solidFill>
+                  <a:srgbClr val="2C2C36"/>
+                </a:solidFill>
+                <a:effectLst/>
+                <a:latin typeface="KaTeX_Main"/>
+              </a:rPr>
+              <a:t>​(</a:t>
+            </a:r>
+            <a:r>
+              <a:rPr lang="en-US" b="1" i="0" dirty="0" err="1">
+                <a:solidFill>
+                  <a:srgbClr val="2C2C36"/>
+                </a:solidFill>
+                <a:effectLst/>
+                <a:latin typeface="KaTeX_Main"/>
+              </a:rPr>
+              <a:t>H</a:t>
+            </a:r>
+            <a:r>
+              <a:rPr lang="en-US" b="0" i="1" dirty="0" err="1">
+                <a:solidFill>
+                  <a:srgbClr val="2C2C36"/>
+                </a:solidFill>
+                <a:effectLst/>
+                <a:latin typeface="KaTeX_Math"/>
+              </a:rPr>
+              <a:t>k</a:t>
+            </a:r>
+            <a:r>
+              <a:rPr lang="en-US" b="0" i="0" dirty="0">
+                <a:solidFill>
+                  <a:srgbClr val="2C2C36"/>
+                </a:solidFill>
+                <a:effectLst/>
+                <a:latin typeface="KaTeX_Main"/>
+              </a:rPr>
+              <a:t>​</a:t>
+            </a:r>
+            <a:r>
+              <a:rPr lang="en-US" b="1" i="0" dirty="0">
+                <a:solidFill>
+                  <a:srgbClr val="2C2C36"/>
+                </a:solidFill>
+                <a:effectLst/>
+                <a:latin typeface="KaTeX_Main"/>
+              </a:rPr>
+              <a:t>P</a:t>
+            </a:r>
+            <a:r>
+              <a:rPr lang="en-US" b="0" i="1" dirty="0">
+                <a:solidFill>
+                  <a:srgbClr val="2C2C36"/>
+                </a:solidFill>
+                <a:effectLst/>
+                <a:latin typeface="KaTeX_Math"/>
+              </a:rPr>
+              <a:t>k</a:t>
+            </a:r>
+            <a:r>
+              <a:rPr lang="en-US" b="0" i="0" dirty="0">
+                <a:solidFill>
+                  <a:srgbClr val="2C2C36"/>
+                </a:solidFill>
+                <a:effectLst/>
+                <a:latin typeface="KaTeX_Main"/>
+              </a:rPr>
+              <a:t>∣</a:t>
+            </a:r>
+            <a:r>
+              <a:rPr lang="en-US" b="0" i="1" dirty="0">
+                <a:solidFill>
+                  <a:srgbClr val="2C2C36"/>
+                </a:solidFill>
+                <a:effectLst/>
+                <a:latin typeface="KaTeX_Math"/>
+              </a:rPr>
+              <a:t>k</a:t>
+            </a:r>
+            <a:r>
+              <a:rPr lang="en-US" b="0" i="0" dirty="0">
+                <a:solidFill>
+                  <a:srgbClr val="2C2C36"/>
+                </a:solidFill>
+                <a:effectLst/>
+                <a:latin typeface="KaTeX_Main"/>
+              </a:rPr>
+              <a:t>−1​</a:t>
+            </a:r>
+            <a:r>
+              <a:rPr lang="en-US" b="1" i="0" dirty="0" err="1">
+                <a:solidFill>
+                  <a:srgbClr val="2C2C36"/>
+                </a:solidFill>
+                <a:effectLst/>
+                <a:latin typeface="KaTeX_Main"/>
+              </a:rPr>
+              <a:t>H</a:t>
+            </a:r>
+            <a:r>
+              <a:rPr lang="en-US" b="0" i="1" dirty="0" err="1">
+                <a:solidFill>
+                  <a:srgbClr val="2C2C36"/>
+                </a:solidFill>
+                <a:effectLst/>
+                <a:latin typeface="KaTeX_Math"/>
+              </a:rPr>
+              <a:t>kT</a:t>
+            </a:r>
+            <a:r>
+              <a:rPr lang="en-US" b="0" i="0" dirty="0">
+                <a:solidFill>
+                  <a:srgbClr val="2C2C36"/>
+                </a:solidFill>
+                <a:effectLst/>
+                <a:latin typeface="KaTeX_Main"/>
+              </a:rPr>
+              <a:t>​+</a:t>
+            </a:r>
+            <a:r>
+              <a:rPr lang="en-US" b="1" i="0" dirty="0" err="1">
+                <a:solidFill>
+                  <a:srgbClr val="2C2C36"/>
+                </a:solidFill>
+                <a:effectLst/>
+                <a:latin typeface="KaTeX_Main"/>
+              </a:rPr>
+              <a:t>R</a:t>
+            </a:r>
+            <a:r>
+              <a:rPr lang="en-US" b="0" i="1" dirty="0" err="1">
+                <a:solidFill>
+                  <a:srgbClr val="2C2C36"/>
+                </a:solidFill>
+                <a:effectLst/>
+                <a:latin typeface="KaTeX_Math"/>
+              </a:rPr>
+              <a:t>k</a:t>
+            </a:r>
+            <a:r>
+              <a:rPr lang="en-US" b="0" i="0" dirty="0">
+                <a:solidFill>
+                  <a:srgbClr val="2C2C36"/>
+                </a:solidFill>
+                <a:effectLst/>
+                <a:latin typeface="KaTeX_Main"/>
+              </a:rPr>
+              <a:t>​)−1</a:t>
+            </a:r>
+            <a:endParaRPr lang="en-US" b="0" i="0" dirty="0">
+              <a:solidFill>
+                <a:srgbClr val="2C2C36"/>
+              </a:solidFill>
+              <a:effectLst/>
+              <a:latin typeface="system-ui"/>
+            </a:endParaRPr>
+          </a:p>
+          <a:p>
+            <a:pPr algn="l">
+              <a:spcBef>
+                <a:spcPts val="900"/>
+              </a:spcBef>
+              <a:spcAft>
+                <a:spcPts val="900"/>
+              </a:spcAft>
+              <a:buFont typeface="+mj-lt"/>
+              <a:buAutoNum type="arabicPeriod"/>
+            </a:pPr>
+            <a:r>
+              <a:rPr lang="en-US" b="0" i="0" dirty="0">
+                <a:solidFill>
+                  <a:srgbClr val="111827"/>
+                </a:solidFill>
+                <a:effectLst/>
+                <a:latin typeface="system-ui"/>
+              </a:rPr>
+              <a:t>Update the State Estimate </a:t>
+            </a:r>
+            <a:r>
+              <a:rPr lang="en-US" b="0" i="0" dirty="0">
+                <a:solidFill>
+                  <a:srgbClr val="2C2C36"/>
+                </a:solidFill>
+                <a:effectLst/>
+                <a:latin typeface="system-ui"/>
+              </a:rPr>
+              <a:t>: Correct the predicted state using the innovation (difference between actual and predicted measurements):</a:t>
+            </a:r>
+          </a:p>
+          <a:p>
+            <a:pPr marL="0" indent="0" algn="l">
+              <a:spcBef>
+                <a:spcPts val="900"/>
+              </a:spcBef>
+              <a:spcAft>
+                <a:spcPts val="900"/>
+              </a:spcAft>
+              <a:buNone/>
+            </a:pPr>
+            <a:r>
+              <a:rPr lang="en-US" b="1" i="0" dirty="0" err="1">
+                <a:solidFill>
+                  <a:srgbClr val="2C2C36"/>
+                </a:solidFill>
+                <a:effectLst/>
+                <a:latin typeface="KaTeX_Main"/>
+              </a:rPr>
+              <a:t>x</a:t>
+            </a:r>
+            <a:r>
+              <a:rPr lang="en-US" b="0" i="0" dirty="0" err="1">
+                <a:solidFill>
+                  <a:srgbClr val="2C2C36"/>
+                </a:solidFill>
+                <a:effectLst/>
+                <a:latin typeface="KaTeX_Main"/>
+              </a:rPr>
+              <a:t>^</a:t>
+            </a:r>
+            <a:r>
+              <a:rPr lang="en-US" b="0" i="1" dirty="0" err="1">
+                <a:solidFill>
+                  <a:srgbClr val="2C2C36"/>
+                </a:solidFill>
+                <a:effectLst/>
+                <a:latin typeface="KaTeX_Math"/>
+              </a:rPr>
+              <a:t>k</a:t>
+            </a:r>
+            <a:r>
+              <a:rPr lang="en-US" b="0" i="0" dirty="0" err="1">
+                <a:solidFill>
+                  <a:srgbClr val="2C2C36"/>
+                </a:solidFill>
+                <a:effectLst/>
+                <a:latin typeface="KaTeX_Main"/>
+              </a:rPr>
+              <a:t>∣</a:t>
+            </a:r>
+            <a:r>
+              <a:rPr lang="en-US" b="0" i="1" dirty="0" err="1">
+                <a:solidFill>
+                  <a:srgbClr val="2C2C36"/>
+                </a:solidFill>
+                <a:effectLst/>
+                <a:latin typeface="KaTeX_Math"/>
+              </a:rPr>
+              <a:t>k</a:t>
+            </a:r>
+            <a:r>
+              <a:rPr lang="en-US" b="0" i="0" dirty="0">
+                <a:solidFill>
+                  <a:srgbClr val="2C2C36"/>
+                </a:solidFill>
+                <a:effectLst/>
+                <a:latin typeface="KaTeX_Main"/>
+              </a:rPr>
+              <a:t>​=</a:t>
+            </a:r>
+            <a:r>
+              <a:rPr lang="en-US" b="1" i="0" dirty="0">
+                <a:solidFill>
+                  <a:srgbClr val="2C2C36"/>
+                </a:solidFill>
+                <a:effectLst/>
+                <a:latin typeface="KaTeX_Main"/>
+              </a:rPr>
+              <a:t>x</a:t>
+            </a:r>
+            <a:r>
+              <a:rPr lang="en-US" b="0" i="0" dirty="0">
+                <a:solidFill>
+                  <a:srgbClr val="2C2C36"/>
+                </a:solidFill>
+                <a:effectLst/>
+                <a:latin typeface="KaTeX_Main"/>
+              </a:rPr>
+              <a:t>^</a:t>
+            </a:r>
+            <a:r>
+              <a:rPr lang="en-US" b="0" i="1" dirty="0">
+                <a:solidFill>
+                  <a:srgbClr val="2C2C36"/>
+                </a:solidFill>
+                <a:effectLst/>
+                <a:latin typeface="KaTeX_Math"/>
+              </a:rPr>
+              <a:t>k</a:t>
+            </a:r>
+            <a:r>
+              <a:rPr lang="en-US" b="0" i="0" dirty="0">
+                <a:solidFill>
+                  <a:srgbClr val="2C2C36"/>
+                </a:solidFill>
+                <a:effectLst/>
+                <a:latin typeface="KaTeX_Main"/>
+              </a:rPr>
+              <a:t>∣</a:t>
+            </a:r>
+            <a:r>
+              <a:rPr lang="en-US" b="0" i="1" dirty="0">
+                <a:solidFill>
+                  <a:srgbClr val="2C2C36"/>
+                </a:solidFill>
+                <a:effectLst/>
+                <a:latin typeface="KaTeX_Math"/>
+              </a:rPr>
+              <a:t>k</a:t>
+            </a:r>
+            <a:r>
+              <a:rPr lang="en-US" b="0" i="0" dirty="0">
+                <a:solidFill>
+                  <a:srgbClr val="2C2C36"/>
+                </a:solidFill>
+                <a:effectLst/>
+                <a:latin typeface="KaTeX_Main"/>
+              </a:rPr>
+              <a:t>−1​+</a:t>
+            </a:r>
+            <a:r>
+              <a:rPr lang="en-US" b="1" i="0" dirty="0">
+                <a:solidFill>
+                  <a:srgbClr val="2C2C36"/>
+                </a:solidFill>
+                <a:effectLst/>
+                <a:latin typeface="KaTeX_Main"/>
+              </a:rPr>
+              <a:t>K</a:t>
+            </a:r>
+            <a:r>
+              <a:rPr lang="en-US" b="0" i="1" dirty="0">
+                <a:solidFill>
+                  <a:srgbClr val="2C2C36"/>
+                </a:solidFill>
+                <a:effectLst/>
+                <a:latin typeface="KaTeX_Math"/>
+              </a:rPr>
+              <a:t>k</a:t>
+            </a:r>
+            <a:r>
+              <a:rPr lang="en-US" b="0" i="0" dirty="0">
+                <a:solidFill>
+                  <a:srgbClr val="2C2C36"/>
+                </a:solidFill>
+                <a:effectLst/>
+                <a:latin typeface="KaTeX_Main"/>
+              </a:rPr>
+              <a:t>​(</a:t>
+            </a:r>
+            <a:r>
+              <a:rPr lang="en-US" b="1" i="0" dirty="0" err="1">
+                <a:solidFill>
+                  <a:srgbClr val="2C2C36"/>
+                </a:solidFill>
+                <a:effectLst/>
+                <a:latin typeface="KaTeX_Main"/>
+              </a:rPr>
+              <a:t>z</a:t>
+            </a:r>
+            <a:r>
+              <a:rPr lang="en-US" b="0" i="1" dirty="0" err="1">
+                <a:solidFill>
+                  <a:srgbClr val="2C2C36"/>
+                </a:solidFill>
+                <a:effectLst/>
+                <a:latin typeface="KaTeX_Math"/>
+              </a:rPr>
+              <a:t>k</a:t>
+            </a:r>
+            <a:r>
+              <a:rPr lang="en-US" b="0" i="0" dirty="0">
+                <a:solidFill>
+                  <a:srgbClr val="2C2C36"/>
+                </a:solidFill>
+                <a:effectLst/>
+                <a:latin typeface="KaTeX_Main"/>
+              </a:rPr>
+              <a:t>​−</a:t>
+            </a:r>
+            <a:r>
+              <a:rPr lang="en-US" b="1" i="0" dirty="0">
+                <a:solidFill>
+                  <a:srgbClr val="2C2C36"/>
+                </a:solidFill>
+                <a:effectLst/>
+                <a:latin typeface="KaTeX_Main"/>
+              </a:rPr>
+              <a:t>z</a:t>
+            </a:r>
+            <a:r>
+              <a:rPr lang="en-US" b="0" i="0" dirty="0">
+                <a:solidFill>
+                  <a:srgbClr val="2C2C36"/>
+                </a:solidFill>
+                <a:effectLst/>
+                <a:latin typeface="KaTeX_Main"/>
+              </a:rPr>
+              <a:t>^</a:t>
+            </a:r>
+            <a:r>
+              <a:rPr lang="en-US" b="0" i="1" dirty="0">
+                <a:solidFill>
+                  <a:srgbClr val="2C2C36"/>
+                </a:solidFill>
+                <a:effectLst/>
+                <a:latin typeface="KaTeX_Math"/>
+              </a:rPr>
+              <a:t>k</a:t>
+            </a:r>
+            <a:r>
+              <a:rPr lang="en-US" b="0" i="0" dirty="0">
+                <a:solidFill>
+                  <a:srgbClr val="2C2C36"/>
+                </a:solidFill>
+                <a:effectLst/>
+                <a:latin typeface="KaTeX_Main"/>
+              </a:rPr>
+              <a:t>∣</a:t>
+            </a:r>
+            <a:r>
+              <a:rPr lang="en-US" b="0" i="1" dirty="0">
+                <a:solidFill>
+                  <a:srgbClr val="2C2C36"/>
+                </a:solidFill>
+                <a:effectLst/>
+                <a:latin typeface="KaTeX_Math"/>
+              </a:rPr>
+              <a:t>k</a:t>
+            </a:r>
+            <a:r>
+              <a:rPr lang="en-US" b="0" i="0" dirty="0">
+                <a:solidFill>
+                  <a:srgbClr val="2C2C36"/>
+                </a:solidFill>
+                <a:effectLst/>
+                <a:latin typeface="KaTeX_Main"/>
+              </a:rPr>
+              <a:t>−1​)</a:t>
+            </a:r>
+            <a:endParaRPr lang="en-US" b="0" i="0" dirty="0">
+              <a:solidFill>
+                <a:srgbClr val="2C2C36"/>
+              </a:solidFill>
+              <a:effectLst/>
+              <a:latin typeface="system-ui"/>
+            </a:endParaRPr>
+          </a:p>
+          <a:p>
+            <a:pPr algn="l">
+              <a:spcBef>
+                <a:spcPts val="900"/>
+              </a:spcBef>
+              <a:spcAft>
+                <a:spcPts val="900"/>
+              </a:spcAft>
+              <a:buFont typeface="+mj-lt"/>
+              <a:buAutoNum type="arabicPeriod"/>
+            </a:pPr>
+            <a:r>
+              <a:rPr lang="en-US" b="0" i="0" dirty="0" err="1">
+                <a:solidFill>
+                  <a:srgbClr val="111827"/>
+                </a:solidFill>
+                <a:effectLst/>
+                <a:latin typeface="system-ui"/>
+              </a:rPr>
+              <a:t>pdate</a:t>
+            </a:r>
+            <a:r>
+              <a:rPr lang="en-US" b="0" i="0" dirty="0">
+                <a:solidFill>
+                  <a:srgbClr val="111827"/>
+                </a:solidFill>
+                <a:effectLst/>
+                <a:latin typeface="system-ui"/>
+              </a:rPr>
+              <a:t> the Error Covariance </a:t>
+            </a:r>
+            <a:r>
+              <a:rPr lang="en-US" b="0" i="0" dirty="0">
+                <a:solidFill>
+                  <a:srgbClr val="2C2C36"/>
+                </a:solidFill>
+                <a:effectLst/>
+                <a:latin typeface="system-ui"/>
+              </a:rPr>
+              <a:t>: Update the error covariance matrix:</a:t>
+            </a:r>
+          </a:p>
+          <a:p>
+            <a:pPr marL="0" indent="0" algn="l">
+              <a:spcBef>
+                <a:spcPts val="900"/>
+              </a:spcBef>
+              <a:spcAft>
+                <a:spcPts val="900"/>
+              </a:spcAft>
+              <a:buNone/>
+            </a:pPr>
+            <a:r>
+              <a:rPr lang="en-US" b="1" i="0" dirty="0" err="1">
+                <a:solidFill>
+                  <a:srgbClr val="2C2C36"/>
+                </a:solidFill>
+                <a:effectLst/>
+                <a:latin typeface="KaTeX_Main"/>
+              </a:rPr>
+              <a:t>P</a:t>
+            </a:r>
+            <a:r>
+              <a:rPr lang="en-US" b="0" i="1" dirty="0" err="1">
+                <a:solidFill>
+                  <a:srgbClr val="2C2C36"/>
+                </a:solidFill>
+                <a:effectLst/>
+                <a:latin typeface="KaTeX_Math"/>
+              </a:rPr>
+              <a:t>k</a:t>
+            </a:r>
+            <a:r>
+              <a:rPr lang="en-US" b="0" i="0" dirty="0" err="1">
+                <a:solidFill>
+                  <a:srgbClr val="2C2C36"/>
+                </a:solidFill>
+                <a:effectLst/>
+                <a:latin typeface="KaTeX_Main"/>
+              </a:rPr>
+              <a:t>∣</a:t>
+            </a:r>
+            <a:r>
+              <a:rPr lang="en-US" b="0" i="1" dirty="0" err="1">
+                <a:solidFill>
+                  <a:srgbClr val="2C2C36"/>
+                </a:solidFill>
+                <a:effectLst/>
+                <a:latin typeface="KaTeX_Math"/>
+              </a:rPr>
+              <a:t>k</a:t>
+            </a:r>
+            <a:r>
+              <a:rPr lang="en-US" b="0" i="0" dirty="0">
+                <a:solidFill>
+                  <a:srgbClr val="2C2C36"/>
+                </a:solidFill>
+                <a:effectLst/>
+                <a:latin typeface="KaTeX_Main"/>
+              </a:rPr>
+              <a:t>​=(</a:t>
+            </a:r>
+            <a:r>
+              <a:rPr lang="en-US" b="1" i="0" dirty="0">
+                <a:solidFill>
+                  <a:srgbClr val="2C2C36"/>
+                </a:solidFill>
+                <a:effectLst/>
+                <a:latin typeface="KaTeX_Main"/>
+              </a:rPr>
+              <a:t>I</a:t>
+            </a:r>
+            <a:r>
+              <a:rPr lang="en-US" b="0" i="0" dirty="0">
+                <a:solidFill>
+                  <a:srgbClr val="2C2C36"/>
+                </a:solidFill>
+                <a:effectLst/>
+                <a:latin typeface="KaTeX_Main"/>
+              </a:rPr>
+              <a:t>−</a:t>
+            </a:r>
+            <a:r>
+              <a:rPr lang="en-US" b="1" i="0" dirty="0">
+                <a:solidFill>
+                  <a:srgbClr val="2C2C36"/>
+                </a:solidFill>
+                <a:effectLst/>
+                <a:latin typeface="KaTeX_Main"/>
+              </a:rPr>
+              <a:t>K</a:t>
+            </a:r>
+            <a:r>
+              <a:rPr lang="en-US" b="0" i="1" dirty="0">
+                <a:solidFill>
+                  <a:srgbClr val="2C2C36"/>
+                </a:solidFill>
+                <a:effectLst/>
+                <a:latin typeface="KaTeX_Math"/>
+              </a:rPr>
+              <a:t>k</a:t>
+            </a:r>
+            <a:r>
+              <a:rPr lang="en-US" b="0" i="0" dirty="0">
+                <a:solidFill>
+                  <a:srgbClr val="2C2C36"/>
+                </a:solidFill>
+                <a:effectLst/>
+                <a:latin typeface="KaTeX_Main"/>
+              </a:rPr>
+              <a:t>​</a:t>
+            </a:r>
+            <a:r>
+              <a:rPr lang="en-US" b="1" i="0" dirty="0" err="1">
+                <a:solidFill>
+                  <a:srgbClr val="2C2C36"/>
+                </a:solidFill>
+                <a:effectLst/>
+                <a:latin typeface="KaTeX_Main"/>
+              </a:rPr>
+              <a:t>H</a:t>
+            </a:r>
+            <a:r>
+              <a:rPr lang="en-US" b="0" i="1" dirty="0" err="1">
+                <a:solidFill>
+                  <a:srgbClr val="2C2C36"/>
+                </a:solidFill>
+                <a:effectLst/>
+                <a:latin typeface="KaTeX_Math"/>
+              </a:rPr>
+              <a:t>k</a:t>
+            </a:r>
+            <a:r>
+              <a:rPr lang="en-US" b="0" i="0" dirty="0">
+                <a:solidFill>
+                  <a:srgbClr val="2C2C36"/>
+                </a:solidFill>
+                <a:effectLst/>
+                <a:latin typeface="KaTeX_Main"/>
+              </a:rPr>
+              <a:t>​)</a:t>
+            </a:r>
+            <a:r>
+              <a:rPr lang="en-US" b="1" i="0" dirty="0">
+                <a:solidFill>
+                  <a:srgbClr val="2C2C36"/>
+                </a:solidFill>
+                <a:effectLst/>
+                <a:latin typeface="KaTeX_Main"/>
+              </a:rPr>
+              <a:t>P</a:t>
+            </a:r>
+            <a:r>
+              <a:rPr lang="en-US" b="0" i="1" dirty="0">
+                <a:solidFill>
+                  <a:srgbClr val="2C2C36"/>
+                </a:solidFill>
+                <a:effectLst/>
+                <a:latin typeface="KaTeX_Math"/>
+              </a:rPr>
+              <a:t>k</a:t>
+            </a:r>
+            <a:r>
+              <a:rPr lang="en-US" b="0" i="0" dirty="0">
+                <a:solidFill>
+                  <a:srgbClr val="2C2C36"/>
+                </a:solidFill>
+                <a:effectLst/>
+                <a:latin typeface="KaTeX_Main"/>
+              </a:rPr>
+              <a:t>∣</a:t>
+            </a:r>
+            <a:r>
+              <a:rPr lang="en-US" b="0" i="1" dirty="0">
+                <a:solidFill>
+                  <a:srgbClr val="2C2C36"/>
+                </a:solidFill>
+                <a:effectLst/>
+                <a:latin typeface="KaTeX_Math"/>
+              </a:rPr>
+              <a:t>k</a:t>
+            </a:r>
+            <a:r>
+              <a:rPr lang="en-US" b="0" i="0" dirty="0">
+                <a:solidFill>
+                  <a:srgbClr val="2C2C36"/>
+                </a:solidFill>
+                <a:effectLst/>
+                <a:latin typeface="KaTeX_Main"/>
+              </a:rPr>
+              <a:t>−1​</a:t>
+            </a:r>
+            <a:br>
+              <a:rPr lang="en-US" dirty="0"/>
+            </a:br>
+            <a:endParaRPr lang="en-US" dirty="0"/>
+          </a:p>
+        </p:txBody>
+      </p:sp>
+    </p:spTree>
+    <p:extLst>
+      <p:ext uri="{BB962C8B-B14F-4D97-AF65-F5344CB8AC3E}">
+        <p14:creationId xmlns:p14="http://schemas.microsoft.com/office/powerpoint/2010/main" val="2031437327"/>
+      </p:ext>
+    </p:extLst>
+  </p:cSld>
+  <p:clrMapOvr>
+    <a:masterClrMapping/>
+  </p:clrMapOvr>
+</p:sld>
+</file>
+
+<file path=ppt/slides/slide19.xml><?xml version="1.0" encoding="utf-8"?>
+<p:sld xmlns:a="http://schemas.openxmlformats.org/drawingml/2006/main" xmlns:r="http://schemas.openxmlformats.org/officeDocument/2006/relationships" xmlns:p="http://schemas.openxmlformats.org/presentationml/2006/main">
+  <p:cSld>
+    <p:spTree>
+      <p:nvGrpSpPr>
+        <p:cNvPr id="1" name=""/>
+        <p:cNvGrpSpPr/>
+        <p:nvPr/>
+      </p:nvGrpSpPr>
+      <p:grpSpPr>
+        <a:xfrm>
+          <a:off x="0" y="0"/>
+          <a:ext cx="0" cy="0"/>
+          <a:chOff x="0" y="0"/>
+          <a:chExt cx="0" cy="0"/>
+        </a:xfrm>
+      </p:grpSpPr>
+      <p:sp>
+        <p:nvSpPr>
+          <p:cNvPr id="2" name="Title 1">
+            <a:extLst>
+              <a:ext uri="{FF2B5EF4-FFF2-40B4-BE49-F238E27FC236}">
+                <a16:creationId xmlns:a16="http://schemas.microsoft.com/office/drawing/2014/main" id="{BE81B1DA-E1D4-1898-D1A2-14198864DD19}"/>
+              </a:ext>
+            </a:extLst>
+          </p:cNvPr>
+          <p:cNvSpPr>
+            <a:spLocks noGrp="1"/>
+          </p:cNvSpPr>
+          <p:nvPr>
+            <p:ph type="title"/>
+          </p:nvPr>
+        </p:nvSpPr>
+        <p:spPr/>
+        <p:txBody>
+          <a:bodyPr/>
+          <a:lstStyle/>
+          <a:p>
+            <a:endParaRPr lang="en-US"/>
+          </a:p>
+        </p:txBody>
+      </p:sp>
+      <p:sp>
+        <p:nvSpPr>
+          <p:cNvPr id="3" name="Content Placeholder 2">
+            <a:extLst>
+              <a:ext uri="{FF2B5EF4-FFF2-40B4-BE49-F238E27FC236}">
+                <a16:creationId xmlns:a16="http://schemas.microsoft.com/office/drawing/2014/main" id="{BCAC1B0B-5962-61A1-05F8-C4C23906A83F}"/>
+              </a:ext>
+            </a:extLst>
+          </p:cNvPr>
+          <p:cNvSpPr>
+            <a:spLocks noGrp="1"/>
+          </p:cNvSpPr>
+          <p:nvPr>
+            <p:ph idx="1"/>
+          </p:nvPr>
+        </p:nvSpPr>
+        <p:spPr/>
+        <p:txBody>
+          <a:bodyPr>
+            <a:normAutofit fontScale="85000" lnSpcReduction="20000"/>
+          </a:bodyPr>
+          <a:lstStyle/>
+          <a:p>
+            <a:pPr algn="l">
+              <a:spcBef>
+                <a:spcPts val="900"/>
+              </a:spcBef>
+              <a:spcAft>
+                <a:spcPts val="900"/>
+              </a:spcAft>
+              <a:buFont typeface="+mj-lt"/>
+              <a:buAutoNum type="arabicPeriod"/>
+            </a:pPr>
+            <a:r>
+              <a:rPr lang="en-US" b="0" i="0" dirty="0">
+                <a:solidFill>
+                  <a:srgbClr val="111827"/>
+                </a:solidFill>
+                <a:effectLst/>
+                <a:latin typeface="system-ui"/>
+              </a:rPr>
+              <a:t>State Transition Model </a:t>
+            </a:r>
+            <a:r>
+              <a:rPr lang="en-US" b="0" i="0" dirty="0">
+                <a:solidFill>
+                  <a:srgbClr val="2C2C36"/>
+                </a:solidFill>
+                <a:effectLst/>
+                <a:latin typeface="system-ui"/>
+              </a:rPr>
+              <a:t>: The state (SoC) evolves based on Coulomb counting:</a:t>
+            </a:r>
+          </a:p>
+          <a:p>
+            <a:pPr marL="0" indent="0" algn="l">
+              <a:spcBef>
+                <a:spcPts val="900"/>
+              </a:spcBef>
+              <a:spcAft>
+                <a:spcPts val="900"/>
+              </a:spcAft>
+              <a:buNone/>
+            </a:pPr>
+            <a:r>
+              <a:rPr lang="en-US" b="0" i="0" dirty="0" err="1">
+                <a:solidFill>
+                  <a:srgbClr val="2C2C36"/>
+                </a:solidFill>
+                <a:effectLst/>
+                <a:latin typeface="KaTeX_Main"/>
+              </a:rPr>
+              <a:t>SoC</a:t>
+            </a:r>
+            <a:r>
+              <a:rPr lang="en-US" b="0" i="1" dirty="0" err="1">
+                <a:solidFill>
+                  <a:srgbClr val="2C2C36"/>
+                </a:solidFill>
+                <a:effectLst/>
+                <a:latin typeface="KaTeX_Math"/>
+              </a:rPr>
+              <a:t>k</a:t>
+            </a:r>
+            <a:r>
+              <a:rPr lang="en-US" b="0" i="0" dirty="0">
+                <a:solidFill>
+                  <a:srgbClr val="2C2C36"/>
+                </a:solidFill>
+                <a:effectLst/>
+                <a:latin typeface="KaTeX_Main"/>
+              </a:rPr>
+              <a:t>​=SoC</a:t>
+            </a:r>
+            <a:r>
+              <a:rPr lang="en-US" b="0" i="1" dirty="0">
+                <a:solidFill>
+                  <a:srgbClr val="2C2C36"/>
+                </a:solidFill>
+                <a:effectLst/>
+                <a:latin typeface="KaTeX_Math"/>
+              </a:rPr>
+              <a:t>k</a:t>
+            </a:r>
+            <a:r>
+              <a:rPr lang="en-US" b="0" i="0" dirty="0">
+                <a:solidFill>
+                  <a:srgbClr val="2C2C36"/>
+                </a:solidFill>
+                <a:effectLst/>
+                <a:latin typeface="KaTeX_Main"/>
+              </a:rPr>
+              <a:t>−1​−</a:t>
+            </a:r>
+            <a:r>
+              <a:rPr lang="en-US" b="0" i="1" dirty="0">
+                <a:solidFill>
+                  <a:srgbClr val="2C2C36"/>
+                </a:solidFill>
+                <a:effectLst/>
+                <a:latin typeface="KaTeX_Math"/>
+              </a:rPr>
+              <a:t>CIk</a:t>
+            </a:r>
+            <a:r>
+              <a:rPr lang="en-US" b="0" i="0" dirty="0">
+                <a:solidFill>
+                  <a:srgbClr val="2C2C36"/>
+                </a:solidFill>
+                <a:effectLst/>
+                <a:latin typeface="KaTeX_Main"/>
+              </a:rPr>
+              <a:t>​</a:t>
+            </a:r>
+            <a:r>
+              <a:rPr lang="en-US" b="0" i="0" dirty="0" err="1">
+                <a:solidFill>
+                  <a:srgbClr val="2C2C36"/>
+                </a:solidFill>
+                <a:effectLst/>
+                <a:latin typeface="KaTeX_Main"/>
+              </a:rPr>
+              <a:t>Δ</a:t>
+            </a:r>
+            <a:r>
+              <a:rPr lang="en-US" b="0" i="1" dirty="0" err="1">
+                <a:solidFill>
+                  <a:srgbClr val="2C2C36"/>
+                </a:solidFill>
+                <a:effectLst/>
+                <a:latin typeface="KaTeX_Math"/>
+              </a:rPr>
+              <a:t>t</a:t>
+            </a:r>
+            <a:r>
+              <a:rPr lang="en-US" b="0" i="0" dirty="0">
+                <a:solidFill>
+                  <a:srgbClr val="2C2C36"/>
+                </a:solidFill>
+                <a:effectLst/>
+                <a:latin typeface="KaTeX_Main"/>
+              </a:rPr>
+              <a:t>​</a:t>
+            </a:r>
+          </a:p>
+          <a:p>
+            <a:pPr algn="l">
+              <a:spcBef>
+                <a:spcPts val="900"/>
+              </a:spcBef>
+              <a:spcAft>
+                <a:spcPts val="900"/>
+              </a:spcAft>
+              <a:buFont typeface="+mj-lt"/>
+              <a:buAutoNum type="arabicPeriod"/>
+            </a:pPr>
+            <a:r>
+              <a:rPr lang="en-US" b="0" i="0" dirty="0">
+                <a:solidFill>
+                  <a:srgbClr val="2C2C36"/>
+                </a:solidFill>
+                <a:effectLst/>
+                <a:latin typeface="system-ui"/>
+              </a:rPr>
+              <a:t>This is linear, so no linearization is needed here.</a:t>
+            </a:r>
+          </a:p>
+          <a:p>
+            <a:pPr>
+              <a:spcBef>
+                <a:spcPts val="900"/>
+              </a:spcBef>
+              <a:spcAft>
+                <a:spcPts val="900"/>
+              </a:spcAft>
+              <a:buNone/>
+            </a:pPr>
+            <a:r>
+              <a:rPr lang="en-US" b="0" dirty="0">
+                <a:solidFill>
+                  <a:srgbClr val="111827"/>
+                </a:solidFill>
+                <a:effectLst/>
+              </a:rPr>
+              <a:t>Measurement Model </a:t>
+            </a:r>
+            <a:r>
+              <a:rPr lang="en-US" dirty="0">
+                <a:effectLst/>
+              </a:rPr>
+              <a:t>: The voltage measurement is related to SoC through the nonlinear OCV function:</a:t>
+            </a:r>
+          </a:p>
+          <a:p>
+            <a:pPr>
+              <a:buNone/>
+            </a:pPr>
+            <a:r>
+              <a:rPr lang="en-US" i="1" dirty="0" err="1">
+                <a:effectLst/>
+                <a:latin typeface="KaTeX_Math"/>
+              </a:rPr>
+              <a:t>Vk</a:t>
+            </a:r>
+            <a:r>
+              <a:rPr lang="en-US" dirty="0">
+                <a:effectLst/>
+                <a:latin typeface="KaTeX_Main"/>
+              </a:rPr>
+              <a:t>​=OCV(</a:t>
+            </a:r>
+            <a:r>
+              <a:rPr lang="en-US" dirty="0" err="1">
+                <a:effectLst/>
+                <a:latin typeface="KaTeX_Main"/>
+              </a:rPr>
+              <a:t>SoC</a:t>
+            </a:r>
+            <a:r>
+              <a:rPr lang="en-US" i="1" dirty="0" err="1">
+                <a:effectLst/>
+                <a:latin typeface="KaTeX_Math"/>
+              </a:rPr>
+              <a:t>k</a:t>
+            </a:r>
+            <a:r>
+              <a:rPr lang="en-US" dirty="0">
+                <a:effectLst/>
+                <a:latin typeface="KaTeX_Main"/>
+              </a:rPr>
+              <a:t>​)−</a:t>
+            </a:r>
+            <a:r>
+              <a:rPr lang="en-US" i="1" dirty="0">
+                <a:effectLst/>
+                <a:latin typeface="KaTeX_Math"/>
+              </a:rPr>
+              <a:t>Ik</a:t>
+            </a:r>
+            <a:r>
+              <a:rPr lang="en-US" dirty="0">
+                <a:effectLst/>
+                <a:latin typeface="KaTeX_Main"/>
+              </a:rPr>
+              <a:t>​</a:t>
+            </a:r>
+            <a:r>
+              <a:rPr lang="en-US" i="1" dirty="0" err="1">
+                <a:effectLst/>
+                <a:latin typeface="KaTeX_Math"/>
+              </a:rPr>
+              <a:t>R</a:t>
+            </a:r>
+            <a:r>
+              <a:rPr lang="en-US" dirty="0" err="1">
+                <a:effectLst/>
+                <a:latin typeface="KaTeX_Main"/>
+              </a:rPr>
+              <a:t>int</a:t>
+            </a:r>
+            <a:r>
+              <a:rPr lang="en-US" dirty="0">
+                <a:effectLst/>
+                <a:latin typeface="KaTeX_Main"/>
+              </a:rPr>
+              <a:t>​+</a:t>
+            </a:r>
+            <a:r>
+              <a:rPr lang="en-US" i="1" dirty="0" err="1">
+                <a:effectLst/>
+                <a:latin typeface="KaTeX_Math"/>
+              </a:rPr>
+              <a:t>v</a:t>
+            </a:r>
+            <a:r>
+              <a:rPr lang="en-US" b="0" i="1" dirty="0" err="1">
+                <a:solidFill>
+                  <a:srgbClr val="2C2C36"/>
+                </a:solidFill>
+                <a:effectLst/>
+                <a:latin typeface="KaTeX_Math"/>
+              </a:rPr>
+              <a:t>k</a:t>
+            </a:r>
+            <a:r>
+              <a:rPr lang="en-US" b="0" i="0" dirty="0">
+                <a:solidFill>
+                  <a:srgbClr val="2C2C36"/>
+                </a:solidFill>
+                <a:effectLst/>
+                <a:latin typeface="KaTeX_Main"/>
+              </a:rPr>
+              <a:t>​</a:t>
+            </a:r>
+          </a:p>
+          <a:p>
+            <a:pPr algn="l">
+              <a:spcBef>
+                <a:spcPts val="900"/>
+              </a:spcBef>
+              <a:spcAft>
+                <a:spcPts val="900"/>
+              </a:spcAft>
+              <a:buNone/>
+            </a:pPr>
+            <a:r>
+              <a:rPr lang="en-US" b="0" i="0" dirty="0">
+                <a:solidFill>
+                  <a:srgbClr val="2C2C36"/>
+                </a:solidFill>
+                <a:effectLst/>
+                <a:latin typeface="system-ui"/>
+              </a:rPr>
+              <a:t>Here:</a:t>
+            </a:r>
+          </a:p>
+          <a:p>
+            <a:pPr algn="l">
+              <a:spcBef>
+                <a:spcPts val="900"/>
+              </a:spcBef>
+              <a:spcAft>
+                <a:spcPts val="900"/>
+              </a:spcAft>
+              <a:buFont typeface="Arial" panose="020B0604020202020204" pitchFamily="34" charset="0"/>
+              <a:buChar char="•"/>
+            </a:pPr>
+            <a:r>
+              <a:rPr lang="en-US" b="0" i="0" dirty="0">
+                <a:solidFill>
+                  <a:srgbClr val="2C2C36"/>
+                </a:solidFill>
+                <a:effectLst/>
+                <a:latin typeface="KaTeX_Main"/>
+              </a:rPr>
+              <a:t>OCV(</a:t>
+            </a:r>
+            <a:r>
+              <a:rPr lang="en-US" b="0" i="0" dirty="0" err="1">
+                <a:solidFill>
+                  <a:srgbClr val="2C2C36"/>
+                </a:solidFill>
+                <a:effectLst/>
+                <a:latin typeface="KaTeX_Main"/>
+              </a:rPr>
+              <a:t>SoC</a:t>
+            </a:r>
+            <a:r>
+              <a:rPr lang="en-US" b="0" i="1" dirty="0" err="1">
+                <a:solidFill>
+                  <a:srgbClr val="2C2C36"/>
+                </a:solidFill>
+                <a:effectLst/>
+                <a:latin typeface="KaTeX_Math"/>
+              </a:rPr>
+              <a:t>k</a:t>
+            </a:r>
+            <a:r>
+              <a:rPr lang="en-US" b="0" i="0" dirty="0">
+                <a:solidFill>
+                  <a:srgbClr val="2C2C36"/>
+                </a:solidFill>
+                <a:effectLst/>
+                <a:latin typeface="KaTeX_Main"/>
+              </a:rPr>
+              <a:t>​)</a:t>
+            </a:r>
+            <a:r>
+              <a:rPr lang="en-US" b="0" i="0" dirty="0">
+                <a:solidFill>
+                  <a:srgbClr val="2C2C36"/>
+                </a:solidFill>
+                <a:effectLst/>
+                <a:latin typeface="system-ui"/>
+              </a:rPr>
+              <a:t> is nonlinear (e.g., quadratic or lookup table).</a:t>
+            </a:r>
+          </a:p>
+          <a:p>
+            <a:pPr algn="l">
+              <a:spcBef>
+                <a:spcPts val="900"/>
+              </a:spcBef>
+              <a:spcAft>
+                <a:spcPts val="900"/>
+              </a:spcAft>
+              <a:buFont typeface="Arial" panose="020B0604020202020204" pitchFamily="34" charset="0"/>
+              <a:buChar char="•"/>
+            </a:pPr>
+            <a:r>
+              <a:rPr lang="en-US" b="0" i="0" dirty="0">
+                <a:solidFill>
+                  <a:srgbClr val="2C2C36"/>
+                </a:solidFill>
+                <a:effectLst/>
+                <a:latin typeface="system-ui"/>
+              </a:rPr>
+              <a:t>The derivative </a:t>
+            </a:r>
+            <a:r>
+              <a:rPr lang="en-US" b="0" i="0" dirty="0">
+                <a:solidFill>
+                  <a:srgbClr val="2C2C36"/>
+                </a:solidFill>
+                <a:effectLst/>
+                <a:latin typeface="KaTeX_Main"/>
+              </a:rPr>
+              <a:t>∂</a:t>
+            </a:r>
+            <a:r>
+              <a:rPr lang="en-US" b="0" i="0" dirty="0" err="1">
+                <a:solidFill>
+                  <a:srgbClr val="2C2C36"/>
+                </a:solidFill>
+                <a:effectLst/>
+                <a:latin typeface="KaTeX_Main"/>
+              </a:rPr>
+              <a:t>SoC∂OCV</a:t>
+            </a:r>
+            <a:r>
+              <a:rPr lang="en-US" b="0" i="0" dirty="0">
+                <a:solidFill>
+                  <a:srgbClr val="2C2C36"/>
+                </a:solidFill>
+                <a:effectLst/>
+                <a:latin typeface="KaTeX_Main"/>
+              </a:rPr>
+              <a:t>​</a:t>
+            </a:r>
+            <a:r>
+              <a:rPr lang="en-US" b="0" i="0" dirty="0">
+                <a:solidFill>
+                  <a:srgbClr val="2C2C36"/>
+                </a:solidFill>
+                <a:effectLst/>
+                <a:latin typeface="system-ui"/>
+              </a:rPr>
+              <a:t> is used to compute the Jacobian </a:t>
+            </a:r>
+            <a:r>
+              <a:rPr lang="en-US" b="1" i="0" dirty="0" err="1">
+                <a:solidFill>
+                  <a:srgbClr val="2C2C36"/>
+                </a:solidFill>
+                <a:effectLst/>
+                <a:latin typeface="KaTeX_Main"/>
+              </a:rPr>
+              <a:t>H</a:t>
+            </a:r>
+            <a:r>
+              <a:rPr lang="en-US" b="0" i="1" dirty="0" err="1">
+                <a:solidFill>
+                  <a:srgbClr val="2C2C36"/>
+                </a:solidFill>
+                <a:effectLst/>
+                <a:latin typeface="KaTeX_Math"/>
+              </a:rPr>
+              <a:t>k</a:t>
+            </a:r>
+            <a:r>
+              <a:rPr lang="en-US" b="0" i="0" dirty="0">
+                <a:solidFill>
+                  <a:srgbClr val="2C2C36"/>
+                </a:solidFill>
+                <a:effectLst/>
+                <a:latin typeface="KaTeX_Main"/>
+              </a:rPr>
+              <a:t>​</a:t>
+            </a:r>
+            <a:r>
+              <a:rPr lang="en-US" b="0" i="0" dirty="0">
+                <a:solidFill>
+                  <a:srgbClr val="2C2C36"/>
+                </a:solidFill>
+                <a:effectLst/>
+                <a:latin typeface="system-ui"/>
+              </a:rPr>
+              <a:t>.</a:t>
+            </a:r>
+            <a:br>
+              <a:rPr lang="en-US" b="0" i="0" dirty="0">
+                <a:solidFill>
+                  <a:srgbClr val="2C2C36"/>
+                </a:solidFill>
+                <a:effectLst/>
+                <a:latin typeface="KaTeX_Main"/>
+              </a:rPr>
+            </a:br>
+            <a:endParaRPr lang="en-US" dirty="0"/>
+          </a:p>
+        </p:txBody>
+      </p:sp>
+    </p:spTree>
+    <p:extLst>
+      <p:ext uri="{BB962C8B-B14F-4D97-AF65-F5344CB8AC3E}">
+        <p14:creationId xmlns:p14="http://schemas.microsoft.com/office/powerpoint/2010/main" val="2916962213"/>
       </p:ext>
     </p:extLst>
   </p:cSld>
@@ -5985,6 +8592,237 @@
     <p:extLst>
       <p:ext uri="{BB962C8B-B14F-4D97-AF65-F5344CB8AC3E}">
         <p14:creationId xmlns:p14="http://schemas.microsoft.com/office/powerpoint/2010/main" val="4115994836"/>
+      </p:ext>
+    </p:extLst>
+  </p:cSld>
+  <p:clrMapOvr>
+    <a:masterClrMapping/>
+  </p:clrMapOvr>
+</p:sld>
+</file>
+
+<file path=ppt/slides/slide20.xml><?xml version="1.0" encoding="utf-8"?>
+<p:sld xmlns:a="http://schemas.openxmlformats.org/drawingml/2006/main" xmlns:r="http://schemas.openxmlformats.org/officeDocument/2006/relationships" xmlns:p="http://schemas.openxmlformats.org/presentationml/2006/main">
+  <p:cSld>
+    <p:spTree>
+      <p:nvGrpSpPr>
+        <p:cNvPr id="1" name=""/>
+        <p:cNvGrpSpPr/>
+        <p:nvPr/>
+      </p:nvGrpSpPr>
+      <p:grpSpPr>
+        <a:xfrm>
+          <a:off x="0" y="0"/>
+          <a:ext cx="0" cy="0"/>
+          <a:chOff x="0" y="0"/>
+          <a:chExt cx="0" cy="0"/>
+        </a:xfrm>
+      </p:grpSpPr>
+      <p:sp>
+        <p:nvSpPr>
+          <p:cNvPr id="2" name="Title 1">
+            <a:extLst>
+              <a:ext uri="{FF2B5EF4-FFF2-40B4-BE49-F238E27FC236}">
+                <a16:creationId xmlns:a16="http://schemas.microsoft.com/office/drawing/2014/main" id="{08F3A995-9124-0C78-500A-4BC6D44BE93B}"/>
+              </a:ext>
+            </a:extLst>
+          </p:cNvPr>
+          <p:cNvSpPr>
+            <a:spLocks noGrp="1"/>
+          </p:cNvSpPr>
+          <p:nvPr>
+            <p:ph type="title"/>
+          </p:nvPr>
+        </p:nvSpPr>
+        <p:spPr/>
+        <p:txBody>
+          <a:bodyPr/>
+          <a:lstStyle/>
+          <a:p>
+            <a:endParaRPr lang="en-US"/>
+          </a:p>
+        </p:txBody>
+      </p:sp>
+      <p:sp>
+        <p:nvSpPr>
+          <p:cNvPr id="3" name="Content Placeholder 2">
+            <a:extLst>
+              <a:ext uri="{FF2B5EF4-FFF2-40B4-BE49-F238E27FC236}">
+                <a16:creationId xmlns:a16="http://schemas.microsoft.com/office/drawing/2014/main" id="{098BF7AF-D06F-F994-F3DF-C3B2587A64AF}"/>
+              </a:ext>
+            </a:extLst>
+          </p:cNvPr>
+          <p:cNvSpPr>
+            <a:spLocks noGrp="1"/>
+          </p:cNvSpPr>
+          <p:nvPr>
+            <p:ph idx="1"/>
+          </p:nvPr>
+        </p:nvSpPr>
+        <p:spPr/>
+        <p:txBody>
+          <a:bodyPr/>
+          <a:lstStyle/>
+          <a:p>
+            <a:pPr algn="l">
+              <a:spcBef>
+                <a:spcPts val="900"/>
+              </a:spcBef>
+              <a:spcAft>
+                <a:spcPts val="900"/>
+              </a:spcAft>
+              <a:buFont typeface="+mj-lt"/>
+              <a:buAutoNum type="arabicPeriod"/>
+            </a:pPr>
+            <a:r>
+              <a:rPr lang="en-US" b="0" i="0" dirty="0">
+                <a:solidFill>
+                  <a:srgbClr val="111827"/>
+                </a:solidFill>
+                <a:effectLst/>
+                <a:latin typeface="system-ui"/>
+              </a:rPr>
+              <a:t>Linearization </a:t>
+            </a:r>
+            <a:r>
+              <a:rPr lang="en-US" b="0" i="0" dirty="0">
+                <a:solidFill>
+                  <a:srgbClr val="2C2C36"/>
+                </a:solidFill>
+                <a:effectLst/>
+                <a:latin typeface="system-ui"/>
+              </a:rPr>
+              <a:t>: The derivative of the OCV function is computed at each step:</a:t>
+            </a:r>
+          </a:p>
+          <a:p>
+            <a:pPr algn="l">
+              <a:spcBef>
+                <a:spcPts val="900"/>
+              </a:spcBef>
+              <a:spcAft>
+                <a:spcPts val="900"/>
+              </a:spcAft>
+              <a:buFont typeface="+mj-lt"/>
+              <a:buAutoNum type="arabicPeriod"/>
+            </a:pPr>
+            <a:r>
+              <a:rPr lang="en-US" b="1" i="0" dirty="0" err="1">
+                <a:solidFill>
+                  <a:srgbClr val="2C2C36"/>
+                </a:solidFill>
+                <a:effectLst/>
+                <a:latin typeface="KaTeX_Main"/>
+              </a:rPr>
+              <a:t>H</a:t>
+            </a:r>
+            <a:r>
+              <a:rPr lang="en-US" b="0" i="1" dirty="0" err="1">
+                <a:solidFill>
+                  <a:srgbClr val="2C2C36"/>
+                </a:solidFill>
+                <a:effectLst/>
+                <a:latin typeface="KaTeX_Math"/>
+              </a:rPr>
+              <a:t>k</a:t>
+            </a:r>
+            <a:r>
+              <a:rPr lang="en-US" b="0" i="0" dirty="0">
+                <a:solidFill>
+                  <a:srgbClr val="2C2C36"/>
+                </a:solidFill>
+                <a:effectLst/>
+                <a:latin typeface="KaTeX_Main"/>
+              </a:rPr>
+              <a:t>​=∂</a:t>
+            </a:r>
+            <a:r>
+              <a:rPr lang="en-US" b="0" i="0" dirty="0" err="1">
+                <a:solidFill>
+                  <a:srgbClr val="2C2C36"/>
+                </a:solidFill>
+                <a:effectLst/>
+                <a:latin typeface="KaTeX_Main"/>
+              </a:rPr>
+              <a:t>SoC∂</a:t>
+            </a:r>
+            <a:r>
+              <a:rPr lang="en-US" b="0" i="1" dirty="0" err="1">
+                <a:solidFill>
+                  <a:srgbClr val="2C2C36"/>
+                </a:solidFill>
+                <a:effectLst/>
+                <a:latin typeface="KaTeX_Math"/>
+              </a:rPr>
+              <a:t>h</a:t>
+            </a:r>
+            <a:r>
+              <a:rPr lang="en-US" b="0" i="0" dirty="0">
+                <a:solidFill>
+                  <a:srgbClr val="2C2C36"/>
+                </a:solidFill>
+                <a:effectLst/>
+                <a:latin typeface="KaTeX_Main"/>
+              </a:rPr>
+              <a:t>​=∂</a:t>
+            </a:r>
+            <a:r>
+              <a:rPr lang="en-US" b="0" i="0" dirty="0" err="1">
+                <a:solidFill>
+                  <a:srgbClr val="2C2C36"/>
+                </a:solidFill>
+                <a:effectLst/>
+                <a:latin typeface="KaTeX_Main"/>
+              </a:rPr>
+              <a:t>SoC∂OCV</a:t>
+            </a:r>
+            <a:r>
+              <a:rPr lang="en-US" b="0" i="0" dirty="0">
+                <a:solidFill>
+                  <a:srgbClr val="2C2C36"/>
+                </a:solidFill>
+                <a:effectLst/>
+                <a:latin typeface="KaTeX_Main"/>
+              </a:rPr>
+              <a:t>​</a:t>
+            </a:r>
+            <a:endParaRPr lang="en-US" b="0" i="0" dirty="0">
+              <a:solidFill>
+                <a:srgbClr val="2C2C36"/>
+              </a:solidFill>
+              <a:effectLst/>
+              <a:latin typeface="system-ui"/>
+            </a:endParaRPr>
+          </a:p>
+          <a:p>
+            <a:pPr algn="l">
+              <a:spcBef>
+                <a:spcPts val="900"/>
+              </a:spcBef>
+              <a:spcAft>
+                <a:spcPts val="900"/>
+              </a:spcAft>
+            </a:pPr>
+            <a:r>
+              <a:rPr lang="en-US" b="0" i="0" dirty="0">
+                <a:solidFill>
+                  <a:srgbClr val="2C2C36"/>
+                </a:solidFill>
+                <a:effectLst/>
+                <a:latin typeface="system-ui"/>
+              </a:rPr>
+              <a:t>This linearization allows the EKF to handle the nonlinear relationship between SoC and voltage</a:t>
+            </a:r>
+          </a:p>
+          <a:p>
+            <a:endParaRPr lang="en-US" dirty="0"/>
+          </a:p>
+        </p:txBody>
+      </p:sp>
+    </p:spTree>
+    <p:extLst>
+      <p:ext uri="{BB962C8B-B14F-4D97-AF65-F5344CB8AC3E}">
+        <p14:creationId xmlns:p14="http://schemas.microsoft.com/office/powerpoint/2010/main" val="535291292"/>
       </p:ext>
     </p:extLst>
   </p:cSld>

</xml_diff>